<commit_message>
Update NM3 ENERGIES Presentation Slides.pptx
Latest version
</commit_message>
<xml_diff>
--- a/NM3 ENERGIES Presentation Slides.pptx
+++ b/NM3 ENERGIES Presentation Slides.pptx
@@ -5,42 +5,41 @@
     <p:sldMasterId id="2147483659" r:id="rId1"/>
   </p:sldMasterIdLst>
   <p:notesMasterIdLst>
-    <p:notesMasterId r:id="rId23"/>
+    <p:notesMasterId r:id="rId22"/>
   </p:notesMasterIdLst>
   <p:sldIdLst>
     <p:sldId id="256" r:id="rId2"/>
     <p:sldId id="257" r:id="rId3"/>
     <p:sldId id="258" r:id="rId4"/>
     <p:sldId id="259" r:id="rId5"/>
-    <p:sldId id="260" r:id="rId6"/>
-    <p:sldId id="261" r:id="rId7"/>
-    <p:sldId id="262" r:id="rId8"/>
-    <p:sldId id="263" r:id="rId9"/>
-    <p:sldId id="264" r:id="rId10"/>
-    <p:sldId id="265" r:id="rId11"/>
-    <p:sldId id="266" r:id="rId12"/>
-    <p:sldId id="267" r:id="rId13"/>
-    <p:sldId id="268" r:id="rId14"/>
-    <p:sldId id="269" r:id="rId15"/>
-    <p:sldId id="270" r:id="rId16"/>
-    <p:sldId id="271" r:id="rId17"/>
-    <p:sldId id="272" r:id="rId18"/>
-    <p:sldId id="273" r:id="rId19"/>
-    <p:sldId id="274" r:id="rId20"/>
-    <p:sldId id="275" r:id="rId21"/>
-    <p:sldId id="276" r:id="rId22"/>
+    <p:sldId id="261" r:id="rId6"/>
+    <p:sldId id="260" r:id="rId7"/>
+    <p:sldId id="263" r:id="rId8"/>
+    <p:sldId id="264" r:id="rId9"/>
+    <p:sldId id="265" r:id="rId10"/>
+    <p:sldId id="266" r:id="rId11"/>
+    <p:sldId id="267" r:id="rId12"/>
+    <p:sldId id="268" r:id="rId13"/>
+    <p:sldId id="269" r:id="rId14"/>
+    <p:sldId id="270" r:id="rId15"/>
+    <p:sldId id="271" r:id="rId16"/>
+    <p:sldId id="272" r:id="rId17"/>
+    <p:sldId id="273" r:id="rId18"/>
+    <p:sldId id="274" r:id="rId19"/>
+    <p:sldId id="275" r:id="rId20"/>
+    <p:sldId id="276" r:id="rId21"/>
   </p:sldIdLst>
   <p:sldSz cx="9144000" cy="5143500" type="screen16x9"/>
   <p:notesSz cx="6858000" cy="9144000"/>
   <p:embeddedFontLst>
     <p:embeddedFont>
       <p:font typeface="Oswald" charset="0"/>
-      <p:regular r:id="rId24"/>
-      <p:bold r:id="rId25"/>
+      <p:regular r:id="rId23"/>
+      <p:bold r:id="rId24"/>
     </p:embeddedFont>
     <p:embeddedFont>
       <p:font typeface="Average" charset="0"/>
-      <p:regular r:id="rId26"/>
+      <p:regular r:id="rId25"/>
     </p:embeddedFont>
   </p:embeddedFontLst>
   <p:defaultTextStyle>
@@ -846,7 +845,7 @@
   <p:cSld>
     <p:spTree>
       <p:nvGrpSpPr>
-        <p:cNvPr id="1" name="Shape 177"/>
+        <p:cNvPr id="1" name="Shape 185"/>
         <p:cNvGrpSpPr/>
         <p:nvPr/>
       </p:nvGrpSpPr>
@@ -860,7 +859,7 @@
       </p:grpSpPr>
       <p:sp>
         <p:nvSpPr>
-          <p:cNvPr id="178" name="Google Shape;178;g12e843cef32_0_62:notes"/>
+          <p:cNvPr id="186" name="Google Shape;186;gc6f980f91_0_48:notes"/>
           <p:cNvSpPr>
             <a:spLocks noGrp="1" noRot="1" noChangeAspect="1"/>
           </p:cNvSpPr>
@@ -901,7 +900,7 @@
       </p:sp>
       <p:sp>
         <p:nvSpPr>
-          <p:cNvPr id="179" name="Google Shape;179;g12e843cef32_0_62:notes"/>
+          <p:cNvPr id="187" name="Google Shape;187;gc6f980f91_0_48:notes"/>
           <p:cNvSpPr txBox="1">
             <a:spLocks noGrp="1"/>
           </p:cNvSpPr>
@@ -946,110 +945,6 @@
 </file>
 
 <file path=ppt/notesSlides/notesSlide11.xml><?xml version="1.0" encoding="utf-8"?>
-<p:notes xmlns:a="http://schemas.openxmlformats.org/drawingml/2006/main" xmlns:r="http://schemas.openxmlformats.org/officeDocument/2006/relationships" xmlns:p="http://schemas.openxmlformats.org/presentationml/2006/main" showMasterSp="0" showMasterPhAnim="0">
-  <p:cSld>
-    <p:spTree>
-      <p:nvGrpSpPr>
-        <p:cNvPr id="1" name="Shape 185"/>
-        <p:cNvGrpSpPr/>
-        <p:nvPr/>
-      </p:nvGrpSpPr>
-      <p:grpSpPr>
-        <a:xfrm>
-          <a:off x="0" y="0"/>
-          <a:ext cx="0" cy="0"/>
-          <a:chOff x="0" y="0"/>
-          <a:chExt cx="0" cy="0"/>
-        </a:xfrm>
-      </p:grpSpPr>
-      <p:sp>
-        <p:nvSpPr>
-          <p:cNvPr id="186" name="Google Shape;186;gc6f980f91_0_48:notes"/>
-          <p:cNvSpPr>
-            <a:spLocks noGrp="1" noRot="1" noChangeAspect="1"/>
-          </p:cNvSpPr>
-          <p:nvPr>
-            <p:ph type="sldImg" idx="2"/>
-          </p:nvPr>
-        </p:nvSpPr>
-        <p:spPr>
-          <a:xfrm>
-            <a:off x="381188" y="685800"/>
-            <a:ext cx="6096300" cy="3429000"/>
-          </a:xfrm>
-          <a:custGeom>
-            <a:avLst/>
-            <a:gdLst/>
-            <a:ahLst/>
-            <a:cxnLst/>
-            <a:rect l="l" t="t" r="r" b="b"/>
-            <a:pathLst>
-              <a:path w="120000" h="120000" extrusionOk="0">
-                <a:moveTo>
-                  <a:pt x="0" y="0"/>
-                </a:moveTo>
-                <a:lnTo>
-                  <a:pt x="120000" y="0"/>
-                </a:lnTo>
-                <a:lnTo>
-                  <a:pt x="120000" y="120000"/>
-                </a:lnTo>
-                <a:lnTo>
-                  <a:pt x="0" y="120000"/>
-                </a:lnTo>
-                <a:close/>
-              </a:path>
-            </a:pathLst>
-          </a:custGeom>
-        </p:spPr>
-      </p:sp>
-      <p:sp>
-        <p:nvSpPr>
-          <p:cNvPr id="187" name="Google Shape;187;gc6f980f91_0_48:notes"/>
-          <p:cNvSpPr txBox="1">
-            <a:spLocks noGrp="1"/>
-          </p:cNvSpPr>
-          <p:nvPr>
-            <p:ph type="body" idx="1"/>
-          </p:nvPr>
-        </p:nvSpPr>
-        <p:spPr>
-          <a:xfrm>
-            <a:off x="685800" y="4343400"/>
-            <a:ext cx="5486400" cy="4114800"/>
-          </a:xfrm>
-          <a:prstGeom prst="rect">
-            <a:avLst/>
-          </a:prstGeom>
-        </p:spPr>
-        <p:txBody>
-          <a:bodyPr spcFirstLastPara="1" wrap="square" lIns="91425" tIns="91425" rIns="91425" bIns="91425" anchor="t" anchorCtr="0">
-            <a:noAutofit/>
-          </a:bodyPr>
-          <a:lstStyle/>
-          <a:p>
-            <a:pPr marL="0" lvl="0" indent="0" algn="l" rtl="0">
-              <a:spcBef>
-                <a:spcPts val="0"/>
-              </a:spcBef>
-              <a:spcAft>
-                <a:spcPts val="0"/>
-              </a:spcAft>
-              <a:buNone/>
-            </a:pPr>
-            <a:endParaRPr/>
-          </a:p>
-        </p:txBody>
-      </p:sp>
-    </p:spTree>
-  </p:cSld>
-  <p:clrMapOvr>
-    <a:masterClrMapping/>
-  </p:clrMapOvr>
-</p:notes>
-</file>
-
-<file path=ppt/notesSlides/notesSlide12.xml><?xml version="1.0" encoding="utf-8"?>
 <p:notes xmlns:a="http://schemas.openxmlformats.org/drawingml/2006/main" xmlns:r="http://schemas.openxmlformats.org/officeDocument/2006/relationships" xmlns:p="http://schemas.openxmlformats.org/presentationml/2006/main" showMasterSp="0" showMasterPhAnim="0">
   <p:cSld>
     <p:spTree>
@@ -1153,7 +1048,7 @@
 </p:notes>
 </file>
 
-<file path=ppt/notesSlides/notesSlide13.xml><?xml version="1.0" encoding="utf-8"?>
+<file path=ppt/notesSlides/notesSlide12.xml><?xml version="1.0" encoding="utf-8"?>
 <p:notes xmlns:a="http://schemas.openxmlformats.org/drawingml/2006/main" xmlns:r="http://schemas.openxmlformats.org/officeDocument/2006/relationships" xmlns:p="http://schemas.openxmlformats.org/presentationml/2006/main" showMasterSp="0" showMasterPhAnim="0">
   <p:cSld>
     <p:spTree>
@@ -1257,7 +1152,7 @@
 </p:notes>
 </file>
 
-<file path=ppt/notesSlides/notesSlide14.xml><?xml version="1.0" encoding="utf-8"?>
+<file path=ppt/notesSlides/notesSlide13.xml><?xml version="1.0" encoding="utf-8"?>
 <p:notes xmlns:a="http://schemas.openxmlformats.org/drawingml/2006/main" xmlns:r="http://schemas.openxmlformats.org/officeDocument/2006/relationships" xmlns:p="http://schemas.openxmlformats.org/presentationml/2006/main" showMasterSp="0" showMasterPhAnim="0">
   <p:cSld>
     <p:spTree>
@@ -1361,7 +1256,7 @@
 </p:notes>
 </file>
 
-<file path=ppt/notesSlides/notesSlide15.xml><?xml version="1.0" encoding="utf-8"?>
+<file path=ppt/notesSlides/notesSlide14.xml><?xml version="1.0" encoding="utf-8"?>
 <p:notes xmlns:a="http://schemas.openxmlformats.org/drawingml/2006/main" xmlns:r="http://schemas.openxmlformats.org/officeDocument/2006/relationships" xmlns:p="http://schemas.openxmlformats.org/presentationml/2006/main" showMasterSp="0" showMasterPhAnim="0">
   <p:cSld>
     <p:spTree>
@@ -1465,7 +1360,7 @@
 </p:notes>
 </file>
 
-<file path=ppt/notesSlides/notesSlide16.xml><?xml version="1.0" encoding="utf-8"?>
+<file path=ppt/notesSlides/notesSlide15.xml><?xml version="1.0" encoding="utf-8"?>
 <p:notes xmlns:a="http://schemas.openxmlformats.org/drawingml/2006/main" xmlns:r="http://schemas.openxmlformats.org/officeDocument/2006/relationships" xmlns:p="http://schemas.openxmlformats.org/presentationml/2006/main" showMasterSp="0" showMasterPhAnim="0">
   <p:cSld>
     <p:spTree>
@@ -1569,7 +1464,7 @@
 </p:notes>
 </file>
 
-<file path=ppt/notesSlides/notesSlide17.xml><?xml version="1.0" encoding="utf-8"?>
+<file path=ppt/notesSlides/notesSlide16.xml><?xml version="1.0" encoding="utf-8"?>
 <p:notes xmlns:a="http://schemas.openxmlformats.org/drawingml/2006/main" xmlns:r="http://schemas.openxmlformats.org/officeDocument/2006/relationships" xmlns:p="http://schemas.openxmlformats.org/presentationml/2006/main" showMasterSp="0" showMasterPhAnim="0">
   <p:cSld>
     <p:spTree>
@@ -1673,7 +1568,7 @@
 </p:notes>
 </file>
 
-<file path=ppt/notesSlides/notesSlide18.xml><?xml version="1.0" encoding="utf-8"?>
+<file path=ppt/notesSlides/notesSlide17.xml><?xml version="1.0" encoding="utf-8"?>
 <p:notes xmlns:a="http://schemas.openxmlformats.org/drawingml/2006/main" xmlns:r="http://schemas.openxmlformats.org/officeDocument/2006/relationships" xmlns:p="http://schemas.openxmlformats.org/presentationml/2006/main" showMasterSp="0" showMasterPhAnim="0">
   <p:cSld>
     <p:spTree>
@@ -1777,7 +1672,7 @@
 </p:notes>
 </file>
 
-<file path=ppt/notesSlides/notesSlide19.xml><?xml version="1.0" encoding="utf-8"?>
+<file path=ppt/notesSlides/notesSlide18.xml><?xml version="1.0" encoding="utf-8"?>
 <p:notes xmlns:a="http://schemas.openxmlformats.org/drawingml/2006/main" xmlns:r="http://schemas.openxmlformats.org/officeDocument/2006/relationships" xmlns:p="http://schemas.openxmlformats.org/presentationml/2006/main" showMasterSp="0" showMasterPhAnim="0">
   <p:cSld>
     <p:spTree>
@@ -2198,6 +2093,110 @@
   <p:cSld>
     <p:spTree>
       <p:nvGrpSpPr>
+        <p:cNvPr id="1" name="Shape 146"/>
+        <p:cNvGrpSpPr/>
+        <p:nvPr/>
+      </p:nvGrpSpPr>
+      <p:grpSpPr>
+        <a:xfrm>
+          <a:off x="0" y="0"/>
+          <a:ext cx="0" cy="0"/>
+          <a:chOff x="0" y="0"/>
+          <a:chExt cx="0" cy="0"/>
+        </a:xfrm>
+      </p:grpSpPr>
+      <p:sp>
+        <p:nvSpPr>
+          <p:cNvPr id="147" name="Google Shape;147;g12e843cef32_0_5:notes"/>
+          <p:cNvSpPr>
+            <a:spLocks noGrp="1" noRot="1" noChangeAspect="1"/>
+          </p:cNvSpPr>
+          <p:nvPr>
+            <p:ph type="sldImg" idx="2"/>
+          </p:nvPr>
+        </p:nvSpPr>
+        <p:spPr>
+          <a:xfrm>
+            <a:off x="381188" y="685800"/>
+            <a:ext cx="6096300" cy="3429000"/>
+          </a:xfrm>
+          <a:custGeom>
+            <a:avLst/>
+            <a:gdLst/>
+            <a:ahLst/>
+            <a:cxnLst/>
+            <a:rect l="l" t="t" r="r" b="b"/>
+            <a:pathLst>
+              <a:path w="120000" h="120000" extrusionOk="0">
+                <a:moveTo>
+                  <a:pt x="0" y="0"/>
+                </a:moveTo>
+                <a:lnTo>
+                  <a:pt x="120000" y="0"/>
+                </a:lnTo>
+                <a:lnTo>
+                  <a:pt x="120000" y="120000"/>
+                </a:lnTo>
+                <a:lnTo>
+                  <a:pt x="0" y="120000"/>
+                </a:lnTo>
+                <a:close/>
+              </a:path>
+            </a:pathLst>
+          </a:custGeom>
+        </p:spPr>
+      </p:sp>
+      <p:sp>
+        <p:nvSpPr>
+          <p:cNvPr id="148" name="Google Shape;148;g12e843cef32_0_5:notes"/>
+          <p:cNvSpPr txBox="1">
+            <a:spLocks noGrp="1"/>
+          </p:cNvSpPr>
+          <p:nvPr>
+            <p:ph type="body" idx="1"/>
+          </p:nvPr>
+        </p:nvSpPr>
+        <p:spPr>
+          <a:xfrm>
+            <a:off x="685800" y="4343400"/>
+            <a:ext cx="5486400" cy="4114800"/>
+          </a:xfrm>
+          <a:prstGeom prst="rect">
+            <a:avLst/>
+          </a:prstGeom>
+        </p:spPr>
+        <p:txBody>
+          <a:bodyPr spcFirstLastPara="1" wrap="square" lIns="91425" tIns="91425" rIns="91425" bIns="91425" anchor="t" anchorCtr="0">
+            <a:noAutofit/>
+          </a:bodyPr>
+          <a:lstStyle/>
+          <a:p>
+            <a:pPr marL="0" lvl="0" indent="0" algn="l" rtl="0">
+              <a:spcBef>
+                <a:spcPts val="0"/>
+              </a:spcBef>
+              <a:spcAft>
+                <a:spcPts val="0"/>
+              </a:spcAft>
+              <a:buNone/>
+            </a:pPr>
+            <a:endParaRPr/>
+          </a:p>
+        </p:txBody>
+      </p:sp>
+    </p:spTree>
+  </p:cSld>
+  <p:clrMapOvr>
+    <a:masterClrMapping/>
+  </p:clrMapOvr>
+</p:notes>
+</file>
+
+<file path=ppt/notesSlides/notesSlide6.xml><?xml version="1.0" encoding="utf-8"?>
+<p:notes xmlns:a="http://schemas.openxmlformats.org/drawingml/2006/main" xmlns:r="http://schemas.openxmlformats.org/officeDocument/2006/relationships" xmlns:p="http://schemas.openxmlformats.org/presentationml/2006/main" showMasterSp="0" showMasterPhAnim="0">
+  <p:cSld>
+    <p:spTree>
+      <p:nvGrpSpPr>
         <p:cNvPr id="1" name="Shape 105"/>
         <p:cNvGrpSpPr/>
         <p:nvPr/>
@@ -2222,8 +2221,8 @@
         </p:nvSpPr>
         <p:spPr>
           <a:xfrm>
-            <a:off x="381188" y="685800"/>
-            <a:ext cx="6096300" cy="3429000"/>
+            <a:off x="381000" y="685800"/>
+            <a:ext cx="6096000" cy="3429000"/>
           </a:xfrm>
           <a:custGeom>
             <a:avLst/>
@@ -2297,215 +2296,7 @@
 </p:notes>
 </file>
 
-<file path=ppt/notesSlides/notesSlide6.xml><?xml version="1.0" encoding="utf-8"?>
-<p:notes xmlns:a="http://schemas.openxmlformats.org/drawingml/2006/main" xmlns:r="http://schemas.openxmlformats.org/officeDocument/2006/relationships" xmlns:p="http://schemas.openxmlformats.org/presentationml/2006/main" showMasterSp="0" showMasterPhAnim="0">
-  <p:cSld>
-    <p:spTree>
-      <p:nvGrpSpPr>
-        <p:cNvPr id="1" name="Shape 146"/>
-        <p:cNvGrpSpPr/>
-        <p:nvPr/>
-      </p:nvGrpSpPr>
-      <p:grpSpPr>
-        <a:xfrm>
-          <a:off x="0" y="0"/>
-          <a:ext cx="0" cy="0"/>
-          <a:chOff x="0" y="0"/>
-          <a:chExt cx="0" cy="0"/>
-        </a:xfrm>
-      </p:grpSpPr>
-      <p:sp>
-        <p:nvSpPr>
-          <p:cNvPr id="147" name="Google Shape;147;g12e843cef32_0_5:notes"/>
-          <p:cNvSpPr>
-            <a:spLocks noGrp="1" noRot="1" noChangeAspect="1"/>
-          </p:cNvSpPr>
-          <p:nvPr>
-            <p:ph type="sldImg" idx="2"/>
-          </p:nvPr>
-        </p:nvSpPr>
-        <p:spPr>
-          <a:xfrm>
-            <a:off x="381188" y="685800"/>
-            <a:ext cx="6096300" cy="3429000"/>
-          </a:xfrm>
-          <a:custGeom>
-            <a:avLst/>
-            <a:gdLst/>
-            <a:ahLst/>
-            <a:cxnLst/>
-            <a:rect l="l" t="t" r="r" b="b"/>
-            <a:pathLst>
-              <a:path w="120000" h="120000" extrusionOk="0">
-                <a:moveTo>
-                  <a:pt x="0" y="0"/>
-                </a:moveTo>
-                <a:lnTo>
-                  <a:pt x="120000" y="0"/>
-                </a:lnTo>
-                <a:lnTo>
-                  <a:pt x="120000" y="120000"/>
-                </a:lnTo>
-                <a:lnTo>
-                  <a:pt x="0" y="120000"/>
-                </a:lnTo>
-                <a:close/>
-              </a:path>
-            </a:pathLst>
-          </a:custGeom>
-        </p:spPr>
-      </p:sp>
-      <p:sp>
-        <p:nvSpPr>
-          <p:cNvPr id="148" name="Google Shape;148;g12e843cef32_0_5:notes"/>
-          <p:cNvSpPr txBox="1">
-            <a:spLocks noGrp="1"/>
-          </p:cNvSpPr>
-          <p:nvPr>
-            <p:ph type="body" idx="1"/>
-          </p:nvPr>
-        </p:nvSpPr>
-        <p:spPr>
-          <a:xfrm>
-            <a:off x="685800" y="4343400"/>
-            <a:ext cx="5486400" cy="4114800"/>
-          </a:xfrm>
-          <a:prstGeom prst="rect">
-            <a:avLst/>
-          </a:prstGeom>
-        </p:spPr>
-        <p:txBody>
-          <a:bodyPr spcFirstLastPara="1" wrap="square" lIns="91425" tIns="91425" rIns="91425" bIns="91425" anchor="t" anchorCtr="0">
-            <a:noAutofit/>
-          </a:bodyPr>
-          <a:lstStyle/>
-          <a:p>
-            <a:pPr marL="0" lvl="0" indent="0" algn="l" rtl="0">
-              <a:spcBef>
-                <a:spcPts val="0"/>
-              </a:spcBef>
-              <a:spcAft>
-                <a:spcPts val="0"/>
-              </a:spcAft>
-              <a:buNone/>
-            </a:pPr>
-            <a:endParaRPr/>
-          </a:p>
-        </p:txBody>
-      </p:sp>
-    </p:spTree>
-  </p:cSld>
-  <p:clrMapOvr>
-    <a:masterClrMapping/>
-  </p:clrMapOvr>
-</p:notes>
-</file>
-
 <file path=ppt/notesSlides/notesSlide7.xml><?xml version="1.0" encoding="utf-8"?>
-<p:notes xmlns:a="http://schemas.openxmlformats.org/drawingml/2006/main" xmlns:r="http://schemas.openxmlformats.org/officeDocument/2006/relationships" xmlns:p="http://schemas.openxmlformats.org/presentationml/2006/main" showMasterSp="0" showMasterPhAnim="0">
-  <p:cSld>
-    <p:spTree>
-      <p:nvGrpSpPr>
-        <p:cNvPr id="1" name="Shape 153"/>
-        <p:cNvGrpSpPr/>
-        <p:nvPr/>
-      </p:nvGrpSpPr>
-      <p:grpSpPr>
-        <a:xfrm>
-          <a:off x="0" y="0"/>
-          <a:ext cx="0" cy="0"/>
-          <a:chOff x="0" y="0"/>
-          <a:chExt cx="0" cy="0"/>
-        </a:xfrm>
-      </p:grpSpPr>
-      <p:sp>
-        <p:nvSpPr>
-          <p:cNvPr id="154" name="Google Shape;154;gc6f980f91_0_33:notes"/>
-          <p:cNvSpPr>
-            <a:spLocks noGrp="1" noRot="1" noChangeAspect="1"/>
-          </p:cNvSpPr>
-          <p:nvPr>
-            <p:ph type="sldImg" idx="2"/>
-          </p:nvPr>
-        </p:nvSpPr>
-        <p:spPr>
-          <a:xfrm>
-            <a:off x="381000" y="685800"/>
-            <a:ext cx="6096000" cy="3429000"/>
-          </a:xfrm>
-          <a:custGeom>
-            <a:avLst/>
-            <a:gdLst/>
-            <a:ahLst/>
-            <a:cxnLst/>
-            <a:rect l="l" t="t" r="r" b="b"/>
-            <a:pathLst>
-              <a:path w="120000" h="120000" extrusionOk="0">
-                <a:moveTo>
-                  <a:pt x="0" y="0"/>
-                </a:moveTo>
-                <a:lnTo>
-                  <a:pt x="120000" y="0"/>
-                </a:lnTo>
-                <a:lnTo>
-                  <a:pt x="120000" y="120000"/>
-                </a:lnTo>
-                <a:lnTo>
-                  <a:pt x="0" y="120000"/>
-                </a:lnTo>
-                <a:close/>
-              </a:path>
-            </a:pathLst>
-          </a:custGeom>
-        </p:spPr>
-      </p:sp>
-      <p:sp>
-        <p:nvSpPr>
-          <p:cNvPr id="155" name="Google Shape;155;gc6f980f91_0_33:notes"/>
-          <p:cNvSpPr txBox="1">
-            <a:spLocks noGrp="1"/>
-          </p:cNvSpPr>
-          <p:nvPr>
-            <p:ph type="body" idx="1"/>
-          </p:nvPr>
-        </p:nvSpPr>
-        <p:spPr>
-          <a:xfrm>
-            <a:off x="685800" y="4343400"/>
-            <a:ext cx="5486400" cy="4114800"/>
-          </a:xfrm>
-          <a:prstGeom prst="rect">
-            <a:avLst/>
-          </a:prstGeom>
-        </p:spPr>
-        <p:txBody>
-          <a:bodyPr spcFirstLastPara="1" wrap="square" lIns="91425" tIns="91425" rIns="91425" bIns="91425" anchor="t" anchorCtr="0">
-            <a:noAutofit/>
-          </a:bodyPr>
-          <a:lstStyle/>
-          <a:p>
-            <a:pPr marL="0" lvl="0" indent="0" algn="l" rtl="0">
-              <a:spcBef>
-                <a:spcPts val="0"/>
-              </a:spcBef>
-              <a:spcAft>
-                <a:spcPts val="0"/>
-              </a:spcAft>
-              <a:buNone/>
-            </a:pPr>
-            <a:endParaRPr/>
-          </a:p>
-        </p:txBody>
-      </p:sp>
-    </p:spTree>
-  </p:cSld>
-  <p:clrMapOvr>
-    <a:masterClrMapping/>
-  </p:clrMapOvr>
-</p:notes>
-</file>
-
-<file path=ppt/notesSlides/notesSlide8.xml><?xml version="1.0" encoding="utf-8"?>
 <p:notes xmlns:a="http://schemas.openxmlformats.org/drawingml/2006/main" xmlns:r="http://schemas.openxmlformats.org/officeDocument/2006/relationships" xmlns:p="http://schemas.openxmlformats.org/presentationml/2006/main" showMasterSp="0" showMasterPhAnim="0">
   <p:cSld>
     <p:spTree>
@@ -2609,7 +2400,7 @@
 </p:notes>
 </file>
 
-<file path=ppt/notesSlides/notesSlide9.xml><?xml version="1.0" encoding="utf-8"?>
+<file path=ppt/notesSlides/notesSlide8.xml><?xml version="1.0" encoding="utf-8"?>
 <p:notes xmlns:a="http://schemas.openxmlformats.org/drawingml/2006/main" xmlns:r="http://schemas.openxmlformats.org/officeDocument/2006/relationships" xmlns:p="http://schemas.openxmlformats.org/presentationml/2006/main" showMasterSp="0" showMasterPhAnim="0">
   <p:cSld>
     <p:spTree>
@@ -2670,6 +2461,110 @@
       <p:sp>
         <p:nvSpPr>
           <p:cNvPr id="171" name="Google Shape;171;gc6f980f91_0_42:notes"/>
+          <p:cNvSpPr txBox="1">
+            <a:spLocks noGrp="1"/>
+          </p:cNvSpPr>
+          <p:nvPr>
+            <p:ph type="body" idx="1"/>
+          </p:nvPr>
+        </p:nvSpPr>
+        <p:spPr>
+          <a:xfrm>
+            <a:off x="685800" y="4343400"/>
+            <a:ext cx="5486400" cy="4114800"/>
+          </a:xfrm>
+          <a:prstGeom prst="rect">
+            <a:avLst/>
+          </a:prstGeom>
+        </p:spPr>
+        <p:txBody>
+          <a:bodyPr spcFirstLastPara="1" wrap="square" lIns="91425" tIns="91425" rIns="91425" bIns="91425" anchor="t" anchorCtr="0">
+            <a:noAutofit/>
+          </a:bodyPr>
+          <a:lstStyle/>
+          <a:p>
+            <a:pPr marL="0" lvl="0" indent="0" algn="l" rtl="0">
+              <a:spcBef>
+                <a:spcPts val="0"/>
+              </a:spcBef>
+              <a:spcAft>
+                <a:spcPts val="0"/>
+              </a:spcAft>
+              <a:buNone/>
+            </a:pPr>
+            <a:endParaRPr/>
+          </a:p>
+        </p:txBody>
+      </p:sp>
+    </p:spTree>
+  </p:cSld>
+  <p:clrMapOvr>
+    <a:masterClrMapping/>
+  </p:clrMapOvr>
+</p:notes>
+</file>
+
+<file path=ppt/notesSlides/notesSlide9.xml><?xml version="1.0" encoding="utf-8"?>
+<p:notes xmlns:a="http://schemas.openxmlformats.org/drawingml/2006/main" xmlns:r="http://schemas.openxmlformats.org/officeDocument/2006/relationships" xmlns:p="http://schemas.openxmlformats.org/presentationml/2006/main" showMasterSp="0" showMasterPhAnim="0">
+  <p:cSld>
+    <p:spTree>
+      <p:nvGrpSpPr>
+        <p:cNvPr id="1" name="Shape 177"/>
+        <p:cNvGrpSpPr/>
+        <p:nvPr/>
+      </p:nvGrpSpPr>
+      <p:grpSpPr>
+        <a:xfrm>
+          <a:off x="0" y="0"/>
+          <a:ext cx="0" cy="0"/>
+          <a:chOff x="0" y="0"/>
+          <a:chExt cx="0" cy="0"/>
+        </a:xfrm>
+      </p:grpSpPr>
+      <p:sp>
+        <p:nvSpPr>
+          <p:cNvPr id="178" name="Google Shape;178;g12e843cef32_0_62:notes"/>
+          <p:cNvSpPr>
+            <a:spLocks noGrp="1" noRot="1" noChangeAspect="1"/>
+          </p:cNvSpPr>
+          <p:nvPr>
+            <p:ph type="sldImg" idx="2"/>
+          </p:nvPr>
+        </p:nvSpPr>
+        <p:spPr>
+          <a:xfrm>
+            <a:off x="381188" y="685800"/>
+            <a:ext cx="6096300" cy="3429000"/>
+          </a:xfrm>
+          <a:custGeom>
+            <a:avLst/>
+            <a:gdLst/>
+            <a:ahLst/>
+            <a:cxnLst/>
+            <a:rect l="l" t="t" r="r" b="b"/>
+            <a:pathLst>
+              <a:path w="120000" h="120000" extrusionOk="0">
+                <a:moveTo>
+                  <a:pt x="0" y="0"/>
+                </a:moveTo>
+                <a:lnTo>
+                  <a:pt x="120000" y="0"/>
+                </a:lnTo>
+                <a:lnTo>
+                  <a:pt x="120000" y="120000"/>
+                </a:lnTo>
+                <a:lnTo>
+                  <a:pt x="0" y="120000"/>
+                </a:lnTo>
+                <a:close/>
+              </a:path>
+            </a:pathLst>
+          </a:custGeom>
+        </p:spPr>
+      </p:sp>
+      <p:sp>
+        <p:nvSpPr>
+          <p:cNvPr id="179" name="Google Shape;179;g12e843cef32_0_62:notes"/>
           <p:cNvSpPr txBox="1">
             <a:spLocks noGrp="1"/>
           </p:cNvSpPr>
@@ -3238,370 +3133,6 @@
 </file>
 
 <file path=ppt/slideLayouts/slideLayout10.xml><?xml version="1.0" encoding="utf-8"?>
-<p:sldLayout xmlns:a="http://schemas.openxmlformats.org/drawingml/2006/main" xmlns:r="http://schemas.openxmlformats.org/officeDocument/2006/relationships" xmlns:p="http://schemas.openxmlformats.org/presentationml/2006/main" matchingName="Big number">
-  <p:cSld name="BIG_NUMBER">
-    <p:spTree>
-      <p:nvGrpSpPr>
-        <p:cNvPr id="1" name="Shape 49"/>
-        <p:cNvGrpSpPr/>
-        <p:nvPr/>
-      </p:nvGrpSpPr>
-      <p:grpSpPr>
-        <a:xfrm>
-          <a:off x="0" y="0"/>
-          <a:ext cx="0" cy="0"/>
-          <a:chOff x="0" y="0"/>
-          <a:chExt cx="0" cy="0"/>
-        </a:xfrm>
-      </p:grpSpPr>
-      <p:sp>
-        <p:nvSpPr>
-          <p:cNvPr id="50" name="Google Shape;50;p11"/>
-          <p:cNvSpPr txBox="1">
-            <a:spLocks noGrp="1"/>
-          </p:cNvSpPr>
-          <p:nvPr>
-            <p:ph type="title" hasCustomPrompt="1"/>
-          </p:nvPr>
-        </p:nvSpPr>
-        <p:spPr>
-          <a:xfrm>
-            <a:off x="311700" y="1255275"/>
-            <a:ext cx="8520600" cy="1890600"/>
-          </a:xfrm>
-          <a:prstGeom prst="rect">
-            <a:avLst/>
-          </a:prstGeom>
-        </p:spPr>
-        <p:txBody>
-          <a:bodyPr spcFirstLastPara="1" wrap="square" lIns="91425" tIns="91425" rIns="91425" bIns="91425" anchor="b" anchorCtr="0">
-            <a:noAutofit/>
-          </a:bodyPr>
-          <a:lstStyle>
-            <a:lvl1pPr lvl="0" algn="ctr">
-              <a:spcBef>
-                <a:spcPts val="0"/>
-              </a:spcBef>
-              <a:spcAft>
-                <a:spcPts val="0"/>
-              </a:spcAft>
-              <a:buSzPts val="12000"/>
-              <a:buNone/>
-              <a:defRPr sz="12000"/>
-            </a:lvl1pPr>
-            <a:lvl2pPr lvl="1" algn="ctr">
-              <a:spcBef>
-                <a:spcPts val="0"/>
-              </a:spcBef>
-              <a:spcAft>
-                <a:spcPts val="0"/>
-              </a:spcAft>
-              <a:buSzPts val="12000"/>
-              <a:buNone/>
-              <a:defRPr sz="12000"/>
-            </a:lvl2pPr>
-            <a:lvl3pPr lvl="2" algn="ctr">
-              <a:spcBef>
-                <a:spcPts val="0"/>
-              </a:spcBef>
-              <a:spcAft>
-                <a:spcPts val="0"/>
-              </a:spcAft>
-              <a:buSzPts val="12000"/>
-              <a:buNone/>
-              <a:defRPr sz="12000"/>
-            </a:lvl3pPr>
-            <a:lvl4pPr lvl="3" algn="ctr">
-              <a:spcBef>
-                <a:spcPts val="0"/>
-              </a:spcBef>
-              <a:spcAft>
-                <a:spcPts val="0"/>
-              </a:spcAft>
-              <a:buSzPts val="12000"/>
-              <a:buNone/>
-              <a:defRPr sz="12000"/>
-            </a:lvl4pPr>
-            <a:lvl5pPr lvl="4" algn="ctr">
-              <a:spcBef>
-                <a:spcPts val="0"/>
-              </a:spcBef>
-              <a:spcAft>
-                <a:spcPts val="0"/>
-              </a:spcAft>
-              <a:buSzPts val="12000"/>
-              <a:buNone/>
-              <a:defRPr sz="12000"/>
-            </a:lvl5pPr>
-            <a:lvl6pPr lvl="5" algn="ctr">
-              <a:spcBef>
-                <a:spcPts val="0"/>
-              </a:spcBef>
-              <a:spcAft>
-                <a:spcPts val="0"/>
-              </a:spcAft>
-              <a:buSzPts val="12000"/>
-              <a:buNone/>
-              <a:defRPr sz="12000"/>
-            </a:lvl6pPr>
-            <a:lvl7pPr lvl="6" algn="ctr">
-              <a:spcBef>
-                <a:spcPts val="0"/>
-              </a:spcBef>
-              <a:spcAft>
-                <a:spcPts val="0"/>
-              </a:spcAft>
-              <a:buSzPts val="12000"/>
-              <a:buNone/>
-              <a:defRPr sz="12000"/>
-            </a:lvl7pPr>
-            <a:lvl8pPr lvl="7" algn="ctr">
-              <a:spcBef>
-                <a:spcPts val="0"/>
-              </a:spcBef>
-              <a:spcAft>
-                <a:spcPts val="0"/>
-              </a:spcAft>
-              <a:buSzPts val="12000"/>
-              <a:buNone/>
-              <a:defRPr sz="12000"/>
-            </a:lvl8pPr>
-            <a:lvl9pPr lvl="8" algn="ctr">
-              <a:spcBef>
-                <a:spcPts val="0"/>
-              </a:spcBef>
-              <a:spcAft>
-                <a:spcPts val="0"/>
-              </a:spcAft>
-              <a:buSzPts val="12000"/>
-              <a:buNone/>
-              <a:defRPr sz="12000"/>
-            </a:lvl9pPr>
-          </a:lstStyle>
-          <a:p>
-            <a:r>
-              <a:t>xx%</a:t>
-            </a:r>
-          </a:p>
-        </p:txBody>
-      </p:sp>
-      <p:sp>
-        <p:nvSpPr>
-          <p:cNvPr id="51" name="Google Shape;51;p11"/>
-          <p:cNvSpPr txBox="1">
-            <a:spLocks noGrp="1"/>
-          </p:cNvSpPr>
-          <p:nvPr>
-            <p:ph type="body" idx="1"/>
-          </p:nvPr>
-        </p:nvSpPr>
-        <p:spPr>
-          <a:xfrm>
-            <a:off x="311700" y="3228425"/>
-            <a:ext cx="8520600" cy="1300800"/>
-          </a:xfrm>
-          <a:prstGeom prst="rect">
-            <a:avLst/>
-          </a:prstGeom>
-        </p:spPr>
-        <p:txBody>
-          <a:bodyPr spcFirstLastPara="1" wrap="square" lIns="91425" tIns="91425" rIns="91425" bIns="91425" anchor="t" anchorCtr="0">
-            <a:noAutofit/>
-          </a:bodyPr>
-          <a:lstStyle>
-            <a:lvl1pPr marL="457200" lvl="0" indent="-342900" algn="ctr">
-              <a:spcBef>
-                <a:spcPts val="0"/>
-              </a:spcBef>
-              <a:spcAft>
-                <a:spcPts val="0"/>
-              </a:spcAft>
-              <a:buSzPts val="1800"/>
-              <a:buChar char="●"/>
-              <a:defRPr/>
-            </a:lvl1pPr>
-            <a:lvl2pPr marL="914400" lvl="1" indent="-317500" algn="ctr">
-              <a:spcBef>
-                <a:spcPts val="1600"/>
-              </a:spcBef>
-              <a:spcAft>
-                <a:spcPts val="0"/>
-              </a:spcAft>
-              <a:buSzPts val="1400"/>
-              <a:buChar char="○"/>
-              <a:defRPr/>
-            </a:lvl2pPr>
-            <a:lvl3pPr marL="1371600" lvl="2" indent="-317500" algn="ctr">
-              <a:spcBef>
-                <a:spcPts val="1600"/>
-              </a:spcBef>
-              <a:spcAft>
-                <a:spcPts val="0"/>
-              </a:spcAft>
-              <a:buSzPts val="1400"/>
-              <a:buChar char="■"/>
-              <a:defRPr/>
-            </a:lvl3pPr>
-            <a:lvl4pPr marL="1828800" lvl="3" indent="-317500" algn="ctr">
-              <a:spcBef>
-                <a:spcPts val="1600"/>
-              </a:spcBef>
-              <a:spcAft>
-                <a:spcPts val="0"/>
-              </a:spcAft>
-              <a:buSzPts val="1400"/>
-              <a:buChar char="●"/>
-              <a:defRPr/>
-            </a:lvl4pPr>
-            <a:lvl5pPr marL="2286000" lvl="4" indent="-317500" algn="ctr">
-              <a:spcBef>
-                <a:spcPts val="1600"/>
-              </a:spcBef>
-              <a:spcAft>
-                <a:spcPts val="0"/>
-              </a:spcAft>
-              <a:buSzPts val="1400"/>
-              <a:buChar char="○"/>
-              <a:defRPr/>
-            </a:lvl5pPr>
-            <a:lvl6pPr marL="2743200" lvl="5" indent="-317500" algn="ctr">
-              <a:spcBef>
-                <a:spcPts val="1600"/>
-              </a:spcBef>
-              <a:spcAft>
-                <a:spcPts val="0"/>
-              </a:spcAft>
-              <a:buSzPts val="1400"/>
-              <a:buChar char="■"/>
-              <a:defRPr/>
-            </a:lvl6pPr>
-            <a:lvl7pPr marL="3200400" lvl="6" indent="-317500" algn="ctr">
-              <a:spcBef>
-                <a:spcPts val="1600"/>
-              </a:spcBef>
-              <a:spcAft>
-                <a:spcPts val="0"/>
-              </a:spcAft>
-              <a:buSzPts val="1400"/>
-              <a:buChar char="●"/>
-              <a:defRPr/>
-            </a:lvl7pPr>
-            <a:lvl8pPr marL="3657600" lvl="7" indent="-317500" algn="ctr">
-              <a:spcBef>
-                <a:spcPts val="1600"/>
-              </a:spcBef>
-              <a:spcAft>
-                <a:spcPts val="0"/>
-              </a:spcAft>
-              <a:buSzPts val="1400"/>
-              <a:buChar char="○"/>
-              <a:defRPr/>
-            </a:lvl8pPr>
-            <a:lvl9pPr marL="4114800" lvl="8" indent="-317500" algn="ctr">
-              <a:spcBef>
-                <a:spcPts val="1600"/>
-              </a:spcBef>
-              <a:spcAft>
-                <a:spcPts val="1600"/>
-              </a:spcAft>
-              <a:buSzPts val="1400"/>
-              <a:buChar char="■"/>
-              <a:defRPr/>
-            </a:lvl9pPr>
-          </a:lstStyle>
-          <a:p>
-            <a:endParaRPr/>
-          </a:p>
-        </p:txBody>
-      </p:sp>
-      <p:sp>
-        <p:nvSpPr>
-          <p:cNvPr id="52" name="Google Shape;52;p11"/>
-          <p:cNvSpPr txBox="1">
-            <a:spLocks noGrp="1"/>
-          </p:cNvSpPr>
-          <p:nvPr>
-            <p:ph type="sldNum" idx="12"/>
-          </p:nvPr>
-        </p:nvSpPr>
-        <p:spPr>
-          <a:xfrm>
-            <a:off x="8490250" y="4681009"/>
-            <a:ext cx="548700" cy="393600"/>
-          </a:xfrm>
-          <a:prstGeom prst="rect">
-            <a:avLst/>
-          </a:prstGeom>
-        </p:spPr>
-        <p:txBody>
-          <a:bodyPr spcFirstLastPara="1" wrap="square" lIns="91425" tIns="91425" rIns="91425" bIns="91425" anchor="ctr" anchorCtr="0">
-            <a:noAutofit/>
-          </a:bodyPr>
-          <a:lstStyle>
-            <a:lvl1pPr lvl="0">
-              <a:buNone/>
-              <a:defRPr/>
-            </a:lvl1pPr>
-            <a:lvl2pPr lvl="1">
-              <a:buNone/>
-              <a:defRPr/>
-            </a:lvl2pPr>
-            <a:lvl3pPr lvl="2">
-              <a:buNone/>
-              <a:defRPr/>
-            </a:lvl3pPr>
-            <a:lvl4pPr lvl="3">
-              <a:buNone/>
-              <a:defRPr/>
-            </a:lvl4pPr>
-            <a:lvl5pPr lvl="4">
-              <a:buNone/>
-              <a:defRPr/>
-            </a:lvl5pPr>
-            <a:lvl6pPr lvl="5">
-              <a:buNone/>
-              <a:defRPr/>
-            </a:lvl6pPr>
-            <a:lvl7pPr lvl="6">
-              <a:buNone/>
-              <a:defRPr/>
-            </a:lvl7pPr>
-            <a:lvl8pPr lvl="7">
-              <a:buNone/>
-              <a:defRPr/>
-            </a:lvl8pPr>
-            <a:lvl9pPr lvl="8">
-              <a:buNone/>
-              <a:defRPr/>
-            </a:lvl9pPr>
-          </a:lstStyle>
-          <a:p>
-            <a:pPr marL="0" lvl="0" indent="0" algn="r" rtl="0">
-              <a:spcBef>
-                <a:spcPts val="0"/>
-              </a:spcBef>
-              <a:spcAft>
-                <a:spcPts val="0"/>
-              </a:spcAft>
-              <a:buNone/>
-            </a:pPr>
-            <a:fld id="{00000000-1234-1234-1234-123412341234}" type="slidenum">
-              <a:rPr lang="en"/>
-              <a:t>‹#›</a:t>
-            </a:fld>
-            <a:endParaRPr/>
-          </a:p>
-        </p:txBody>
-      </p:sp>
-    </p:spTree>
-  </p:cSld>
-  <p:clrMapOvr>
-    <a:masterClrMapping/>
-  </p:clrMapOvr>
-</p:sldLayout>
-</file>
-
-<file path=ppt/slideLayouts/slideLayout11.xml><?xml version="1.0" encoding="utf-8"?>
 <p:sldLayout xmlns:a="http://schemas.openxmlformats.org/drawingml/2006/main" xmlns:r="http://schemas.openxmlformats.org/officeDocument/2006/relationships" xmlns:p="http://schemas.openxmlformats.org/presentationml/2006/main" matchingName="Blank" type="blank">
   <p:cSld name="BLANK">
     <p:spTree>
@@ -3706,239 +3237,6 @@
 </file>
 
 <file path=ppt/slideLayouts/slideLayout2.xml><?xml version="1.0" encoding="utf-8"?>
-<p:sldLayout xmlns:a="http://schemas.openxmlformats.org/drawingml/2006/main" xmlns:r="http://schemas.openxmlformats.org/officeDocument/2006/relationships" xmlns:p="http://schemas.openxmlformats.org/presentationml/2006/main" matchingName="Section header" type="secHead">
-  <p:cSld name="SECTION_HEADER">
-    <p:spTree>
-      <p:nvGrpSpPr>
-        <p:cNvPr id="1" name="Shape 17"/>
-        <p:cNvGrpSpPr/>
-        <p:nvPr/>
-      </p:nvGrpSpPr>
-      <p:grpSpPr>
-        <a:xfrm>
-          <a:off x="0" y="0"/>
-          <a:ext cx="0" cy="0"/>
-          <a:chOff x="0" y="0"/>
-          <a:chExt cx="0" cy="0"/>
-        </a:xfrm>
-      </p:grpSpPr>
-      <p:sp>
-        <p:nvSpPr>
-          <p:cNvPr id="18" name="Google Shape;18;p3"/>
-          <p:cNvSpPr txBox="1">
-            <a:spLocks noGrp="1"/>
-          </p:cNvSpPr>
-          <p:nvPr>
-            <p:ph type="title"/>
-          </p:nvPr>
-        </p:nvSpPr>
-        <p:spPr>
-          <a:xfrm>
-            <a:off x="671250" y="2141250"/>
-            <a:ext cx="7852200" cy="861000"/>
-          </a:xfrm>
-          <a:prstGeom prst="rect">
-            <a:avLst/>
-          </a:prstGeom>
-        </p:spPr>
-        <p:txBody>
-          <a:bodyPr spcFirstLastPara="1" wrap="square" lIns="91425" tIns="91425" rIns="91425" bIns="91425" anchor="ctr" anchorCtr="0">
-            <a:noAutofit/>
-          </a:bodyPr>
-          <a:lstStyle>
-            <a:lvl1pPr lvl="0" algn="ctr">
-              <a:spcBef>
-                <a:spcPts val="0"/>
-              </a:spcBef>
-              <a:spcAft>
-                <a:spcPts val="0"/>
-              </a:spcAft>
-              <a:buSzPts val="3600"/>
-              <a:buNone/>
-              <a:defRPr sz="3600"/>
-            </a:lvl1pPr>
-            <a:lvl2pPr lvl="1" algn="ctr">
-              <a:spcBef>
-                <a:spcPts val="0"/>
-              </a:spcBef>
-              <a:spcAft>
-                <a:spcPts val="0"/>
-              </a:spcAft>
-              <a:buSzPts val="3600"/>
-              <a:buNone/>
-              <a:defRPr sz="3600"/>
-            </a:lvl2pPr>
-            <a:lvl3pPr lvl="2" algn="ctr">
-              <a:spcBef>
-                <a:spcPts val="0"/>
-              </a:spcBef>
-              <a:spcAft>
-                <a:spcPts val="0"/>
-              </a:spcAft>
-              <a:buSzPts val="3600"/>
-              <a:buNone/>
-              <a:defRPr sz="3600"/>
-            </a:lvl3pPr>
-            <a:lvl4pPr lvl="3" algn="ctr">
-              <a:spcBef>
-                <a:spcPts val="0"/>
-              </a:spcBef>
-              <a:spcAft>
-                <a:spcPts val="0"/>
-              </a:spcAft>
-              <a:buSzPts val="3600"/>
-              <a:buNone/>
-              <a:defRPr sz="3600"/>
-            </a:lvl4pPr>
-            <a:lvl5pPr lvl="4" algn="ctr">
-              <a:spcBef>
-                <a:spcPts val="0"/>
-              </a:spcBef>
-              <a:spcAft>
-                <a:spcPts val="0"/>
-              </a:spcAft>
-              <a:buSzPts val="3600"/>
-              <a:buNone/>
-              <a:defRPr sz="3600"/>
-            </a:lvl5pPr>
-            <a:lvl6pPr lvl="5" algn="ctr">
-              <a:spcBef>
-                <a:spcPts val="0"/>
-              </a:spcBef>
-              <a:spcAft>
-                <a:spcPts val="0"/>
-              </a:spcAft>
-              <a:buSzPts val="3600"/>
-              <a:buNone/>
-              <a:defRPr sz="3600"/>
-            </a:lvl6pPr>
-            <a:lvl7pPr lvl="6" algn="ctr">
-              <a:spcBef>
-                <a:spcPts val="0"/>
-              </a:spcBef>
-              <a:spcAft>
-                <a:spcPts val="0"/>
-              </a:spcAft>
-              <a:buSzPts val="3600"/>
-              <a:buNone/>
-              <a:defRPr sz="3600"/>
-            </a:lvl7pPr>
-            <a:lvl8pPr lvl="7" algn="ctr">
-              <a:spcBef>
-                <a:spcPts val="0"/>
-              </a:spcBef>
-              <a:spcAft>
-                <a:spcPts val="0"/>
-              </a:spcAft>
-              <a:buSzPts val="3600"/>
-              <a:buNone/>
-              <a:defRPr sz="3600"/>
-            </a:lvl8pPr>
-            <a:lvl9pPr lvl="8" algn="ctr">
-              <a:spcBef>
-                <a:spcPts val="0"/>
-              </a:spcBef>
-              <a:spcAft>
-                <a:spcPts val="0"/>
-              </a:spcAft>
-              <a:buSzPts val="3600"/>
-              <a:buNone/>
-              <a:defRPr sz="3600"/>
-            </a:lvl9pPr>
-          </a:lstStyle>
-          <a:p>
-            <a:endParaRPr/>
-          </a:p>
-        </p:txBody>
-      </p:sp>
-      <p:sp>
-        <p:nvSpPr>
-          <p:cNvPr id="19" name="Google Shape;19;p3"/>
-          <p:cNvSpPr txBox="1">
-            <a:spLocks noGrp="1"/>
-          </p:cNvSpPr>
-          <p:nvPr>
-            <p:ph type="sldNum" idx="12"/>
-          </p:nvPr>
-        </p:nvSpPr>
-        <p:spPr>
-          <a:xfrm>
-            <a:off x="8490250" y="4681009"/>
-            <a:ext cx="548700" cy="393600"/>
-          </a:xfrm>
-          <a:prstGeom prst="rect">
-            <a:avLst/>
-          </a:prstGeom>
-        </p:spPr>
-        <p:txBody>
-          <a:bodyPr spcFirstLastPara="1" wrap="square" lIns="91425" tIns="91425" rIns="91425" bIns="91425" anchor="ctr" anchorCtr="0">
-            <a:noAutofit/>
-          </a:bodyPr>
-          <a:lstStyle>
-            <a:lvl1pPr lvl="0">
-              <a:buNone/>
-              <a:defRPr/>
-            </a:lvl1pPr>
-            <a:lvl2pPr lvl="1">
-              <a:buNone/>
-              <a:defRPr/>
-            </a:lvl2pPr>
-            <a:lvl3pPr lvl="2">
-              <a:buNone/>
-              <a:defRPr/>
-            </a:lvl3pPr>
-            <a:lvl4pPr lvl="3">
-              <a:buNone/>
-              <a:defRPr/>
-            </a:lvl4pPr>
-            <a:lvl5pPr lvl="4">
-              <a:buNone/>
-              <a:defRPr/>
-            </a:lvl5pPr>
-            <a:lvl6pPr lvl="5">
-              <a:buNone/>
-              <a:defRPr/>
-            </a:lvl6pPr>
-            <a:lvl7pPr lvl="6">
-              <a:buNone/>
-              <a:defRPr/>
-            </a:lvl7pPr>
-            <a:lvl8pPr lvl="7">
-              <a:buNone/>
-              <a:defRPr/>
-            </a:lvl8pPr>
-            <a:lvl9pPr lvl="8">
-              <a:buNone/>
-              <a:defRPr/>
-            </a:lvl9pPr>
-          </a:lstStyle>
-          <a:p>
-            <a:pPr marL="0" lvl="0" indent="0" algn="r" rtl="0">
-              <a:spcBef>
-                <a:spcPts val="0"/>
-              </a:spcBef>
-              <a:spcAft>
-                <a:spcPts val="0"/>
-              </a:spcAft>
-              <a:buNone/>
-            </a:pPr>
-            <a:fld id="{00000000-1234-1234-1234-123412341234}" type="slidenum">
-              <a:rPr lang="en"/>
-              <a:t>‹#›</a:t>
-            </a:fld>
-            <a:endParaRPr/>
-          </a:p>
-        </p:txBody>
-      </p:sp>
-    </p:spTree>
-  </p:cSld>
-  <p:clrMapOvr>
-    <a:masterClrMapping/>
-  </p:clrMapOvr>
-</p:sldLayout>
-</file>
-
-<file path=ppt/slideLayouts/slideLayout3.xml><?xml version="1.0" encoding="utf-8"?>
 <p:sldLayout xmlns:a="http://schemas.openxmlformats.org/drawingml/2006/main" xmlns:r="http://schemas.openxmlformats.org/officeDocument/2006/relationships" xmlns:p="http://schemas.openxmlformats.org/presentationml/2006/main" matchingName="Title and body" type="tx">
   <p:cSld name="TITLE_AND_BODY">
     <p:spTree>
@@ -4300,7 +3598,7 @@
 </p:sldLayout>
 </file>
 
-<file path=ppt/slideLayouts/slideLayout4.xml><?xml version="1.0" encoding="utf-8"?>
+<file path=ppt/slideLayouts/slideLayout3.xml><?xml version="1.0" encoding="utf-8"?>
 <p:sldLayout xmlns:a="http://schemas.openxmlformats.org/drawingml/2006/main" xmlns:r="http://schemas.openxmlformats.org/officeDocument/2006/relationships" xmlns:p="http://schemas.openxmlformats.org/presentationml/2006/main" matchingName="Title and two columns" type="twoColTx">
   <p:cSld name="TITLE_AND_TWO_COLUMNS">
     <p:spTree>
@@ -4791,7 +4089,7 @@
 </p:sldLayout>
 </file>
 
-<file path=ppt/slideLayouts/slideLayout5.xml><?xml version="1.0" encoding="utf-8"?>
+<file path=ppt/slideLayouts/slideLayout4.xml><?xml version="1.0" encoding="utf-8"?>
 <p:sldLayout xmlns:a="http://schemas.openxmlformats.org/drawingml/2006/main" xmlns:r="http://schemas.openxmlformats.org/officeDocument/2006/relationships" xmlns:p="http://schemas.openxmlformats.org/presentationml/2006/main" matchingName="Title only" type="titleOnly">
   <p:cSld name="TITLE_ONLY">
     <p:spTree>
@@ -5024,7 +4322,7 @@
 </p:sldLayout>
 </file>
 
-<file path=ppt/slideLayouts/slideLayout6.xml><?xml version="1.0" encoding="utf-8"?>
+<file path=ppt/slideLayouts/slideLayout5.xml><?xml version="1.0" encoding="utf-8"?>
 <p:sldLayout xmlns:a="http://schemas.openxmlformats.org/drawingml/2006/main" xmlns:r="http://schemas.openxmlformats.org/officeDocument/2006/relationships" xmlns:p="http://schemas.openxmlformats.org/presentationml/2006/main" matchingName="One column text">
   <p:cSld name="ONE_COLUMN_TEXT">
     <p:spTree>
@@ -5386,7 +4684,7 @@
 </p:sldLayout>
 </file>
 
-<file path=ppt/slideLayouts/slideLayout7.xml><?xml version="1.0" encoding="utf-8"?>
+<file path=ppt/slideLayouts/slideLayout6.xml><?xml version="1.0" encoding="utf-8"?>
 <p:sldLayout xmlns:a="http://schemas.openxmlformats.org/drawingml/2006/main" xmlns:r="http://schemas.openxmlformats.org/officeDocument/2006/relationships" xmlns:p="http://schemas.openxmlformats.org/presentationml/2006/main" matchingName="Main point">
   <p:cSld name="MAIN_POINT">
     <p:bg>
@@ -5726,7 +5024,7 @@
 </p:sldLayout>
 </file>
 
-<file path=ppt/slideLayouts/slideLayout8.xml><?xml version="1.0" encoding="utf-8"?>
+<file path=ppt/slideLayouts/slideLayout7.xml><?xml version="1.0" encoding="utf-8"?>
 <p:sldLayout xmlns:a="http://schemas.openxmlformats.org/drawingml/2006/main" xmlns:r="http://schemas.openxmlformats.org/officeDocument/2006/relationships" xmlns:p="http://schemas.openxmlformats.org/presentationml/2006/main" matchingName="Section title and description">
   <p:cSld name="SECTION_TITLE_AND_DESCRIPTION">
     <p:spTree>
@@ -6472,7 +5770,7 @@
 </p:sldLayout>
 </file>
 
-<file path=ppt/slideLayouts/slideLayout9.xml><?xml version="1.0" encoding="utf-8"?>
+<file path=ppt/slideLayouts/slideLayout8.xml><?xml version="1.0" encoding="utf-8"?>
 <p:sldLayout xmlns:a="http://schemas.openxmlformats.org/drawingml/2006/main" xmlns:r="http://schemas.openxmlformats.org/officeDocument/2006/relationships" xmlns:p="http://schemas.openxmlformats.org/presentationml/2006/main" matchingName="Caption">
   <p:cSld name="CAPTION_ONLY">
     <p:spTree>
@@ -6548,6 +5846,370 @@
       <p:sp>
         <p:nvSpPr>
           <p:cNvPr id="48" name="Google Shape;48;p10"/>
+          <p:cNvSpPr txBox="1">
+            <a:spLocks noGrp="1"/>
+          </p:cNvSpPr>
+          <p:nvPr>
+            <p:ph type="sldNum" idx="12"/>
+          </p:nvPr>
+        </p:nvSpPr>
+        <p:spPr>
+          <a:xfrm>
+            <a:off x="8490250" y="4681009"/>
+            <a:ext cx="548700" cy="393600"/>
+          </a:xfrm>
+          <a:prstGeom prst="rect">
+            <a:avLst/>
+          </a:prstGeom>
+        </p:spPr>
+        <p:txBody>
+          <a:bodyPr spcFirstLastPara="1" wrap="square" lIns="91425" tIns="91425" rIns="91425" bIns="91425" anchor="ctr" anchorCtr="0">
+            <a:noAutofit/>
+          </a:bodyPr>
+          <a:lstStyle>
+            <a:lvl1pPr lvl="0">
+              <a:buNone/>
+              <a:defRPr/>
+            </a:lvl1pPr>
+            <a:lvl2pPr lvl="1">
+              <a:buNone/>
+              <a:defRPr/>
+            </a:lvl2pPr>
+            <a:lvl3pPr lvl="2">
+              <a:buNone/>
+              <a:defRPr/>
+            </a:lvl3pPr>
+            <a:lvl4pPr lvl="3">
+              <a:buNone/>
+              <a:defRPr/>
+            </a:lvl4pPr>
+            <a:lvl5pPr lvl="4">
+              <a:buNone/>
+              <a:defRPr/>
+            </a:lvl5pPr>
+            <a:lvl6pPr lvl="5">
+              <a:buNone/>
+              <a:defRPr/>
+            </a:lvl6pPr>
+            <a:lvl7pPr lvl="6">
+              <a:buNone/>
+              <a:defRPr/>
+            </a:lvl7pPr>
+            <a:lvl8pPr lvl="7">
+              <a:buNone/>
+              <a:defRPr/>
+            </a:lvl8pPr>
+            <a:lvl9pPr lvl="8">
+              <a:buNone/>
+              <a:defRPr/>
+            </a:lvl9pPr>
+          </a:lstStyle>
+          <a:p>
+            <a:pPr marL="0" lvl="0" indent="0" algn="r" rtl="0">
+              <a:spcBef>
+                <a:spcPts val="0"/>
+              </a:spcBef>
+              <a:spcAft>
+                <a:spcPts val="0"/>
+              </a:spcAft>
+              <a:buNone/>
+            </a:pPr>
+            <a:fld id="{00000000-1234-1234-1234-123412341234}" type="slidenum">
+              <a:rPr lang="en"/>
+              <a:t>‹#›</a:t>
+            </a:fld>
+            <a:endParaRPr/>
+          </a:p>
+        </p:txBody>
+      </p:sp>
+    </p:spTree>
+  </p:cSld>
+  <p:clrMapOvr>
+    <a:masterClrMapping/>
+  </p:clrMapOvr>
+</p:sldLayout>
+</file>
+
+<file path=ppt/slideLayouts/slideLayout9.xml><?xml version="1.0" encoding="utf-8"?>
+<p:sldLayout xmlns:a="http://schemas.openxmlformats.org/drawingml/2006/main" xmlns:r="http://schemas.openxmlformats.org/officeDocument/2006/relationships" xmlns:p="http://schemas.openxmlformats.org/presentationml/2006/main" matchingName="Big number">
+  <p:cSld name="BIG_NUMBER">
+    <p:spTree>
+      <p:nvGrpSpPr>
+        <p:cNvPr id="1" name="Shape 49"/>
+        <p:cNvGrpSpPr/>
+        <p:nvPr/>
+      </p:nvGrpSpPr>
+      <p:grpSpPr>
+        <a:xfrm>
+          <a:off x="0" y="0"/>
+          <a:ext cx="0" cy="0"/>
+          <a:chOff x="0" y="0"/>
+          <a:chExt cx="0" cy="0"/>
+        </a:xfrm>
+      </p:grpSpPr>
+      <p:sp>
+        <p:nvSpPr>
+          <p:cNvPr id="50" name="Google Shape;50;p11"/>
+          <p:cNvSpPr txBox="1">
+            <a:spLocks noGrp="1"/>
+          </p:cNvSpPr>
+          <p:nvPr>
+            <p:ph type="title" hasCustomPrompt="1"/>
+          </p:nvPr>
+        </p:nvSpPr>
+        <p:spPr>
+          <a:xfrm>
+            <a:off x="311700" y="1255275"/>
+            <a:ext cx="8520600" cy="1890600"/>
+          </a:xfrm>
+          <a:prstGeom prst="rect">
+            <a:avLst/>
+          </a:prstGeom>
+        </p:spPr>
+        <p:txBody>
+          <a:bodyPr spcFirstLastPara="1" wrap="square" lIns="91425" tIns="91425" rIns="91425" bIns="91425" anchor="b" anchorCtr="0">
+            <a:noAutofit/>
+          </a:bodyPr>
+          <a:lstStyle>
+            <a:lvl1pPr lvl="0" algn="ctr">
+              <a:spcBef>
+                <a:spcPts val="0"/>
+              </a:spcBef>
+              <a:spcAft>
+                <a:spcPts val="0"/>
+              </a:spcAft>
+              <a:buSzPts val="12000"/>
+              <a:buNone/>
+              <a:defRPr sz="12000"/>
+            </a:lvl1pPr>
+            <a:lvl2pPr lvl="1" algn="ctr">
+              <a:spcBef>
+                <a:spcPts val="0"/>
+              </a:spcBef>
+              <a:spcAft>
+                <a:spcPts val="0"/>
+              </a:spcAft>
+              <a:buSzPts val="12000"/>
+              <a:buNone/>
+              <a:defRPr sz="12000"/>
+            </a:lvl2pPr>
+            <a:lvl3pPr lvl="2" algn="ctr">
+              <a:spcBef>
+                <a:spcPts val="0"/>
+              </a:spcBef>
+              <a:spcAft>
+                <a:spcPts val="0"/>
+              </a:spcAft>
+              <a:buSzPts val="12000"/>
+              <a:buNone/>
+              <a:defRPr sz="12000"/>
+            </a:lvl3pPr>
+            <a:lvl4pPr lvl="3" algn="ctr">
+              <a:spcBef>
+                <a:spcPts val="0"/>
+              </a:spcBef>
+              <a:spcAft>
+                <a:spcPts val="0"/>
+              </a:spcAft>
+              <a:buSzPts val="12000"/>
+              <a:buNone/>
+              <a:defRPr sz="12000"/>
+            </a:lvl4pPr>
+            <a:lvl5pPr lvl="4" algn="ctr">
+              <a:spcBef>
+                <a:spcPts val="0"/>
+              </a:spcBef>
+              <a:spcAft>
+                <a:spcPts val="0"/>
+              </a:spcAft>
+              <a:buSzPts val="12000"/>
+              <a:buNone/>
+              <a:defRPr sz="12000"/>
+            </a:lvl5pPr>
+            <a:lvl6pPr lvl="5" algn="ctr">
+              <a:spcBef>
+                <a:spcPts val="0"/>
+              </a:spcBef>
+              <a:spcAft>
+                <a:spcPts val="0"/>
+              </a:spcAft>
+              <a:buSzPts val="12000"/>
+              <a:buNone/>
+              <a:defRPr sz="12000"/>
+            </a:lvl6pPr>
+            <a:lvl7pPr lvl="6" algn="ctr">
+              <a:spcBef>
+                <a:spcPts val="0"/>
+              </a:spcBef>
+              <a:spcAft>
+                <a:spcPts val="0"/>
+              </a:spcAft>
+              <a:buSzPts val="12000"/>
+              <a:buNone/>
+              <a:defRPr sz="12000"/>
+            </a:lvl7pPr>
+            <a:lvl8pPr lvl="7" algn="ctr">
+              <a:spcBef>
+                <a:spcPts val="0"/>
+              </a:spcBef>
+              <a:spcAft>
+                <a:spcPts val="0"/>
+              </a:spcAft>
+              <a:buSzPts val="12000"/>
+              <a:buNone/>
+              <a:defRPr sz="12000"/>
+            </a:lvl8pPr>
+            <a:lvl9pPr lvl="8" algn="ctr">
+              <a:spcBef>
+                <a:spcPts val="0"/>
+              </a:spcBef>
+              <a:spcAft>
+                <a:spcPts val="0"/>
+              </a:spcAft>
+              <a:buSzPts val="12000"/>
+              <a:buNone/>
+              <a:defRPr sz="12000"/>
+            </a:lvl9pPr>
+          </a:lstStyle>
+          <a:p>
+            <a:r>
+              <a:t>xx%</a:t>
+            </a:r>
+          </a:p>
+        </p:txBody>
+      </p:sp>
+      <p:sp>
+        <p:nvSpPr>
+          <p:cNvPr id="51" name="Google Shape;51;p11"/>
+          <p:cNvSpPr txBox="1">
+            <a:spLocks noGrp="1"/>
+          </p:cNvSpPr>
+          <p:nvPr>
+            <p:ph type="body" idx="1"/>
+          </p:nvPr>
+        </p:nvSpPr>
+        <p:spPr>
+          <a:xfrm>
+            <a:off x="311700" y="3228425"/>
+            <a:ext cx="8520600" cy="1300800"/>
+          </a:xfrm>
+          <a:prstGeom prst="rect">
+            <a:avLst/>
+          </a:prstGeom>
+        </p:spPr>
+        <p:txBody>
+          <a:bodyPr spcFirstLastPara="1" wrap="square" lIns="91425" tIns="91425" rIns="91425" bIns="91425" anchor="t" anchorCtr="0">
+            <a:noAutofit/>
+          </a:bodyPr>
+          <a:lstStyle>
+            <a:lvl1pPr marL="457200" lvl="0" indent="-342900" algn="ctr">
+              <a:spcBef>
+                <a:spcPts val="0"/>
+              </a:spcBef>
+              <a:spcAft>
+                <a:spcPts val="0"/>
+              </a:spcAft>
+              <a:buSzPts val="1800"/>
+              <a:buChar char="●"/>
+              <a:defRPr/>
+            </a:lvl1pPr>
+            <a:lvl2pPr marL="914400" lvl="1" indent="-317500" algn="ctr">
+              <a:spcBef>
+                <a:spcPts val="1600"/>
+              </a:spcBef>
+              <a:spcAft>
+                <a:spcPts val="0"/>
+              </a:spcAft>
+              <a:buSzPts val="1400"/>
+              <a:buChar char="○"/>
+              <a:defRPr/>
+            </a:lvl2pPr>
+            <a:lvl3pPr marL="1371600" lvl="2" indent="-317500" algn="ctr">
+              <a:spcBef>
+                <a:spcPts val="1600"/>
+              </a:spcBef>
+              <a:spcAft>
+                <a:spcPts val="0"/>
+              </a:spcAft>
+              <a:buSzPts val="1400"/>
+              <a:buChar char="■"/>
+              <a:defRPr/>
+            </a:lvl3pPr>
+            <a:lvl4pPr marL="1828800" lvl="3" indent="-317500" algn="ctr">
+              <a:spcBef>
+                <a:spcPts val="1600"/>
+              </a:spcBef>
+              <a:spcAft>
+                <a:spcPts val="0"/>
+              </a:spcAft>
+              <a:buSzPts val="1400"/>
+              <a:buChar char="●"/>
+              <a:defRPr/>
+            </a:lvl4pPr>
+            <a:lvl5pPr marL="2286000" lvl="4" indent="-317500" algn="ctr">
+              <a:spcBef>
+                <a:spcPts val="1600"/>
+              </a:spcBef>
+              <a:spcAft>
+                <a:spcPts val="0"/>
+              </a:spcAft>
+              <a:buSzPts val="1400"/>
+              <a:buChar char="○"/>
+              <a:defRPr/>
+            </a:lvl5pPr>
+            <a:lvl6pPr marL="2743200" lvl="5" indent="-317500" algn="ctr">
+              <a:spcBef>
+                <a:spcPts val="1600"/>
+              </a:spcBef>
+              <a:spcAft>
+                <a:spcPts val="0"/>
+              </a:spcAft>
+              <a:buSzPts val="1400"/>
+              <a:buChar char="■"/>
+              <a:defRPr/>
+            </a:lvl6pPr>
+            <a:lvl7pPr marL="3200400" lvl="6" indent="-317500" algn="ctr">
+              <a:spcBef>
+                <a:spcPts val="1600"/>
+              </a:spcBef>
+              <a:spcAft>
+                <a:spcPts val="0"/>
+              </a:spcAft>
+              <a:buSzPts val="1400"/>
+              <a:buChar char="●"/>
+              <a:defRPr/>
+            </a:lvl7pPr>
+            <a:lvl8pPr marL="3657600" lvl="7" indent="-317500" algn="ctr">
+              <a:spcBef>
+                <a:spcPts val="1600"/>
+              </a:spcBef>
+              <a:spcAft>
+                <a:spcPts val="0"/>
+              </a:spcAft>
+              <a:buSzPts val="1400"/>
+              <a:buChar char="○"/>
+              <a:defRPr/>
+            </a:lvl8pPr>
+            <a:lvl9pPr marL="4114800" lvl="8" indent="-317500" algn="ctr">
+              <a:spcBef>
+                <a:spcPts val="1600"/>
+              </a:spcBef>
+              <a:spcAft>
+                <a:spcPts val="1600"/>
+              </a:spcAft>
+              <a:buSzPts val="1400"/>
+              <a:buChar char="■"/>
+              <a:defRPr/>
+            </a:lvl9pPr>
+          </a:lstStyle>
+          <a:p>
+            <a:endParaRPr/>
+          </a:p>
+        </p:txBody>
+      </p:sp>
+      <p:sp>
+        <p:nvSpPr>
+          <p:cNvPr id="52" name="Google Shape;52;p11"/>
           <p:cNvSpPr txBox="1">
             <a:spLocks noGrp="1"/>
           </p:cNvSpPr>
@@ -7326,16 +6988,15 @@
   <p:clrMap bg1="lt1" tx1="dk1" bg2="dk2" tx2="lt2" accent1="accent1" accent2="accent2" accent3="accent3" accent4="accent4" accent5="accent5" accent6="accent6" hlink="hlink" folHlink="folHlink"/>
   <p:sldLayoutIdLst>
     <p:sldLayoutId id="2147483648" r:id="rId1"/>
-    <p:sldLayoutId id="2147483649" r:id="rId2"/>
-    <p:sldLayoutId id="2147483650" r:id="rId3"/>
-    <p:sldLayoutId id="2147483651" r:id="rId4"/>
-    <p:sldLayoutId id="2147483652" r:id="rId5"/>
-    <p:sldLayoutId id="2147483653" r:id="rId6"/>
-    <p:sldLayoutId id="2147483654" r:id="rId7"/>
-    <p:sldLayoutId id="2147483655" r:id="rId8"/>
-    <p:sldLayoutId id="2147483656" r:id="rId9"/>
-    <p:sldLayoutId id="2147483657" r:id="rId10"/>
-    <p:sldLayoutId id="2147483658" r:id="rId11"/>
+    <p:sldLayoutId id="2147483650" r:id="rId2"/>
+    <p:sldLayoutId id="2147483651" r:id="rId3"/>
+    <p:sldLayoutId id="2147483652" r:id="rId4"/>
+    <p:sldLayoutId id="2147483653" r:id="rId5"/>
+    <p:sldLayoutId id="2147483654" r:id="rId6"/>
+    <p:sldLayoutId id="2147483655" r:id="rId7"/>
+    <p:sldLayoutId id="2147483656" r:id="rId8"/>
+    <p:sldLayoutId id="2147483657" r:id="rId9"/>
+    <p:sldLayoutId id="2147483658" r:id="rId10"/>
   </p:sldLayoutIdLst>
   <p:hf sldNum="0" hdr="0" ftr="0" dt="0"/>
   <p:txStyles>
@@ -8311,301 +7972,6 @@
   <p:cSld>
     <p:spTree>
       <p:nvGrpSpPr>
-        <p:cNvPr id="1" name="Shape 180"/>
-        <p:cNvGrpSpPr/>
-        <p:nvPr/>
-      </p:nvGrpSpPr>
-      <p:grpSpPr>
-        <a:xfrm>
-          <a:off x="0" y="0"/>
-          <a:ext cx="0" cy="0"/>
-          <a:chOff x="0" y="0"/>
-          <a:chExt cx="0" cy="0"/>
-        </a:xfrm>
-      </p:grpSpPr>
-      <p:sp>
-        <p:nvSpPr>
-          <p:cNvPr id="181" name="Google Shape;181;p22"/>
-          <p:cNvSpPr txBox="1">
-            <a:spLocks noGrp="1"/>
-          </p:cNvSpPr>
-          <p:nvPr>
-            <p:ph type="title"/>
-          </p:nvPr>
-        </p:nvSpPr>
-        <p:spPr>
-          <a:xfrm>
-            <a:off x="159300" y="140225"/>
-            <a:ext cx="3999900" cy="572700"/>
-          </a:xfrm>
-          <a:prstGeom prst="rect">
-            <a:avLst/>
-          </a:prstGeom>
-        </p:spPr>
-        <p:txBody>
-          <a:bodyPr spcFirstLastPara="1" wrap="square" lIns="91425" tIns="91425" rIns="91425" bIns="91425" anchor="t" anchorCtr="0">
-            <a:noAutofit/>
-          </a:bodyPr>
-          <a:lstStyle/>
-          <a:p>
-            <a:pPr marL="0" lvl="0" indent="0" algn="l" rtl="0">
-              <a:spcBef>
-                <a:spcPts val="0"/>
-              </a:spcBef>
-              <a:spcAft>
-                <a:spcPts val="0"/>
-              </a:spcAft>
-              <a:buNone/>
-            </a:pPr>
-            <a:r>
-              <a:rPr lang="en" sz="2700"/>
-              <a:t>Skew &amp; Kurtosis Analysis</a:t>
-            </a:r>
-            <a:endParaRPr sz="2700"/>
-          </a:p>
-        </p:txBody>
-      </p:sp>
-      <p:sp>
-        <p:nvSpPr>
-          <p:cNvPr id="182" name="Google Shape;182;p22"/>
-          <p:cNvSpPr txBox="1">
-            <a:spLocks noGrp="1"/>
-          </p:cNvSpPr>
-          <p:nvPr>
-            <p:ph type="body" idx="1"/>
-          </p:nvPr>
-        </p:nvSpPr>
-        <p:spPr>
-          <a:xfrm>
-            <a:off x="311700" y="1152475"/>
-            <a:ext cx="3999900" cy="3416400"/>
-          </a:xfrm>
-          <a:prstGeom prst="rect">
-            <a:avLst/>
-          </a:prstGeom>
-        </p:spPr>
-        <p:txBody>
-          <a:bodyPr spcFirstLastPara="1" wrap="square" lIns="91425" tIns="91425" rIns="91425" bIns="91425" anchor="t" anchorCtr="0">
-            <a:noAutofit/>
-          </a:bodyPr>
-          <a:lstStyle/>
-          <a:p>
-            <a:pPr marL="0" lvl="0" indent="0" algn="l" rtl="0">
-              <a:spcBef>
-                <a:spcPts val="0"/>
-              </a:spcBef>
-              <a:spcAft>
-                <a:spcPts val="0"/>
-              </a:spcAft>
-              <a:buNone/>
-            </a:pPr>
-            <a:r>
-              <a:rPr lang="en" sz="2100" b="1">
-                <a:solidFill>
-                  <a:schemeClr val="dk1"/>
-                </a:solidFill>
-              </a:rPr>
-              <a:t>Skew Analysis</a:t>
-            </a:r>
-            <a:endParaRPr sz="2100" b="1">
-              <a:solidFill>
-                <a:schemeClr val="dk1"/>
-              </a:solidFill>
-            </a:endParaRPr>
-          </a:p>
-          <a:p>
-            <a:pPr marL="457200" lvl="0" indent="-330200" algn="l" rtl="0">
-              <a:spcBef>
-                <a:spcPts val="1600"/>
-              </a:spcBef>
-              <a:spcAft>
-                <a:spcPts val="0"/>
-              </a:spcAft>
-              <a:buSzPts val="1600"/>
-              <a:buChar char="●"/>
-            </a:pPr>
-            <a:r>
-              <a:rPr lang="en" sz="1600"/>
-              <a:t>We found there to be missing information in the </a:t>
-            </a:r>
-            <a:r>
-              <a:rPr lang="en" sz="1600" b="1"/>
-              <a:t>Valencia_pressure</a:t>
-            </a:r>
-            <a:r>
-              <a:rPr lang="en" sz="1600"/>
-              <a:t> column in the dataset.</a:t>
-            </a:r>
-            <a:endParaRPr sz="1600"/>
-          </a:p>
-          <a:p>
-            <a:pPr marL="457200" lvl="0" indent="-330200" algn="l" rtl="0">
-              <a:spcBef>
-                <a:spcPts val="0"/>
-              </a:spcBef>
-              <a:spcAft>
-                <a:spcPts val="0"/>
-              </a:spcAft>
-              <a:buSzPts val="1600"/>
-              <a:buChar char="●"/>
-            </a:pPr>
-            <a:r>
-              <a:rPr lang="en" sz="1600"/>
-              <a:t>The time column was in a string format which we had to convert to </a:t>
-            </a:r>
-            <a:r>
-              <a:rPr lang="en" sz="1600" b="1"/>
-              <a:t>datetime</a:t>
-            </a:r>
-            <a:r>
-              <a:rPr lang="en" sz="1600"/>
-              <a:t> to make it suitable for out process.</a:t>
-            </a:r>
-            <a:endParaRPr sz="1600"/>
-          </a:p>
-          <a:p>
-            <a:pPr marL="457200" lvl="0" indent="-330200" algn="l" rtl="0">
-              <a:spcBef>
-                <a:spcPts val="0"/>
-              </a:spcBef>
-              <a:spcAft>
-                <a:spcPts val="0"/>
-              </a:spcAft>
-              <a:buSzPts val="1600"/>
-              <a:buChar char="●"/>
-            </a:pPr>
-            <a:r>
-              <a:rPr lang="en" sz="1600"/>
-              <a:t>Other features were converted to floats(numerical values) for the regression process.</a:t>
-            </a:r>
-            <a:endParaRPr sz="1600"/>
-          </a:p>
-        </p:txBody>
-      </p:sp>
-      <p:sp>
-        <p:nvSpPr>
-          <p:cNvPr id="183" name="Google Shape;183;p22"/>
-          <p:cNvSpPr txBox="1">
-            <a:spLocks noGrp="1"/>
-          </p:cNvSpPr>
-          <p:nvPr>
-            <p:ph type="body" idx="2"/>
-          </p:nvPr>
-        </p:nvSpPr>
-        <p:spPr>
-          <a:xfrm>
-            <a:off x="4832400" y="1152475"/>
-            <a:ext cx="3999900" cy="3416400"/>
-          </a:xfrm>
-          <a:prstGeom prst="rect">
-            <a:avLst/>
-          </a:prstGeom>
-        </p:spPr>
-        <p:txBody>
-          <a:bodyPr spcFirstLastPara="1" wrap="square" lIns="91425" tIns="91425" rIns="91425" bIns="91425" anchor="t" anchorCtr="0">
-            <a:noAutofit/>
-          </a:bodyPr>
-          <a:lstStyle/>
-          <a:p>
-            <a:pPr marL="0" lvl="0" indent="0" algn="l" rtl="0">
-              <a:spcBef>
-                <a:spcPts val="0"/>
-              </a:spcBef>
-              <a:spcAft>
-                <a:spcPts val="0"/>
-              </a:spcAft>
-              <a:buNone/>
-            </a:pPr>
-            <a:r>
-              <a:rPr lang="en" sz="2100" b="1">
-                <a:solidFill>
-                  <a:schemeClr val="dk1"/>
-                </a:solidFill>
-              </a:rPr>
-              <a:t>Kurtosis Analysis</a:t>
-            </a:r>
-            <a:endParaRPr sz="2100" b="1">
-              <a:solidFill>
-                <a:schemeClr val="dk1"/>
-              </a:solidFill>
-            </a:endParaRPr>
-          </a:p>
-          <a:p>
-            <a:pPr marL="457200" lvl="0" indent="-330200" algn="l" rtl="0">
-              <a:spcBef>
-                <a:spcPts val="1600"/>
-              </a:spcBef>
-              <a:spcAft>
-                <a:spcPts val="0"/>
-              </a:spcAft>
-              <a:buSzPts val="1600"/>
-              <a:buChar char="●"/>
-            </a:pPr>
-            <a:r>
-              <a:rPr lang="en" sz="1600"/>
-              <a:t>We had to take an in-depth view of our dataset by performing what we call a descriptive stat for each feature,i.e; the mean, median, 1st quartile, 3rd quartile, the maximum and minimum values of each feature.</a:t>
-            </a:r>
-            <a:endParaRPr sz="1600"/>
-          </a:p>
-          <a:p>
-            <a:pPr marL="457200" lvl="0" indent="-330200" algn="l" rtl="0">
-              <a:spcBef>
-                <a:spcPts val="0"/>
-              </a:spcBef>
-              <a:spcAft>
-                <a:spcPts val="0"/>
-              </a:spcAft>
-              <a:buSzPts val="1600"/>
-              <a:buChar char="●"/>
-            </a:pPr>
-            <a:r>
-              <a:rPr lang="en" sz="1600"/>
-              <a:t>This gave us more information and insight about the dataset.</a:t>
-            </a:r>
-            <a:endParaRPr sz="1600"/>
-          </a:p>
-        </p:txBody>
-      </p:sp>
-      <p:pic>
-        <p:nvPicPr>
-          <p:cNvPr id="184" name="Google Shape;184;p22"/>
-          <p:cNvPicPr preferRelativeResize="0"/>
-          <p:nvPr/>
-        </p:nvPicPr>
-        <p:blipFill rotWithShape="1">
-          <a:blip r:embed="rId3">
-            <a:alphaModFix/>
-          </a:blip>
-          <a:srcRect t="3925" b="3934"/>
-          <a:stretch/>
-        </p:blipFill>
-        <p:spPr>
-          <a:xfrm>
-            <a:off x="6791900" y="4595475"/>
-            <a:ext cx="2352100" cy="571925"/>
-          </a:xfrm>
-          <a:prstGeom prst="rect">
-            <a:avLst/>
-          </a:prstGeom>
-          <a:noFill/>
-          <a:ln>
-            <a:noFill/>
-          </a:ln>
-        </p:spPr>
-      </p:pic>
-    </p:spTree>
-  </p:cSld>
-  <p:clrMapOvr>
-    <a:masterClrMapping/>
-  </p:clrMapOvr>
-</p:sld>
-</file>
-
-<file path=ppt/slides/slide11.xml><?xml version="1.0" encoding="utf-8"?>
-<p:sld xmlns:a="http://schemas.openxmlformats.org/drawingml/2006/main" xmlns:r="http://schemas.openxmlformats.org/officeDocument/2006/relationships" xmlns:p="http://schemas.openxmlformats.org/presentationml/2006/main">
-  <p:cSld>
-    <p:spTree>
-      <p:nvGrpSpPr>
         <p:cNvPr id="1" name="Shape 188"/>
         <p:cNvGrpSpPr/>
         <p:nvPr/>
@@ -8723,7 +8089,7 @@
 </p:sld>
 </file>
 
-<file path=ppt/slides/slide12.xml><?xml version="1.0" encoding="utf-8"?>
+<file path=ppt/slides/slide11.xml><?xml version="1.0" encoding="utf-8"?>
 <p:sld xmlns:a="http://schemas.openxmlformats.org/drawingml/2006/main" xmlns:r="http://schemas.openxmlformats.org/officeDocument/2006/relationships" xmlns:p="http://schemas.openxmlformats.org/presentationml/2006/main">
   <p:cSld>
     <p:spTree>
@@ -8845,7 +8211,7 @@
 </p:sld>
 </file>
 
-<file path=ppt/slides/slide13.xml><?xml version="1.0" encoding="utf-8"?>
+<file path=ppt/slides/slide12.xml><?xml version="1.0" encoding="utf-8"?>
 <p:sld xmlns:a="http://schemas.openxmlformats.org/drawingml/2006/main" xmlns:r="http://schemas.openxmlformats.org/officeDocument/2006/relationships" xmlns:p="http://schemas.openxmlformats.org/presentationml/2006/main">
   <p:cSld>
     <p:spTree>
@@ -9099,7 +8465,7 @@
 </p:sld>
 </file>
 
-<file path=ppt/slides/slide14.xml><?xml version="1.0" encoding="utf-8"?>
+<file path=ppt/slides/slide13.xml><?xml version="1.0" encoding="utf-8"?>
 <p:sld xmlns:a="http://schemas.openxmlformats.org/drawingml/2006/main" xmlns:r="http://schemas.openxmlformats.org/officeDocument/2006/relationships" xmlns:p="http://schemas.openxmlformats.org/presentationml/2006/main">
   <p:cSld>
     <p:spTree>
@@ -9179,7 +8545,7 @@
 </p:sld>
 </file>
 
-<file path=ppt/slides/slide15.xml><?xml version="1.0" encoding="utf-8"?>
+<file path=ppt/slides/slide14.xml><?xml version="1.0" encoding="utf-8"?>
 <p:sld xmlns:a="http://schemas.openxmlformats.org/drawingml/2006/main" xmlns:r="http://schemas.openxmlformats.org/officeDocument/2006/relationships" xmlns:p="http://schemas.openxmlformats.org/presentationml/2006/main">
   <p:cSld>
     <p:bg>
@@ -9534,7 +8900,7 @@
 </p:sld>
 </file>
 
-<file path=ppt/slides/slide16.xml><?xml version="1.0" encoding="utf-8"?>
+<file path=ppt/slides/slide15.xml><?xml version="1.0" encoding="utf-8"?>
 <p:sld xmlns:a="http://schemas.openxmlformats.org/drawingml/2006/main" xmlns:r="http://schemas.openxmlformats.org/officeDocument/2006/relationships" xmlns:p="http://schemas.openxmlformats.org/presentationml/2006/main">
   <p:cSld>
     <p:spTree>
@@ -9905,7 +9271,7 @@
 </p:sld>
 </file>
 
-<file path=ppt/slides/slide17.xml><?xml version="1.0" encoding="utf-8"?>
+<file path=ppt/slides/slide16.xml><?xml version="1.0" encoding="utf-8"?>
 <p:sld xmlns:a="http://schemas.openxmlformats.org/drawingml/2006/main" xmlns:r="http://schemas.openxmlformats.org/officeDocument/2006/relationships" xmlns:p="http://schemas.openxmlformats.org/presentationml/2006/main">
   <p:cSld>
     <p:spTree>
@@ -10927,7 +10293,7 @@
 </p:sld>
 </file>
 
-<file path=ppt/slides/slide18.xml><?xml version="1.0" encoding="utf-8"?>
+<file path=ppt/slides/slide17.xml><?xml version="1.0" encoding="utf-8"?>
 <p:sld xmlns:a="http://schemas.openxmlformats.org/drawingml/2006/main" xmlns:r="http://schemas.openxmlformats.org/officeDocument/2006/relationships" xmlns:p="http://schemas.openxmlformats.org/presentationml/2006/main">
   <p:cSld>
     <p:spTree>
@@ -11157,7 +10523,7 @@
               <a:buNone/>
             </a:pPr>
             <a:r>
-              <a:rPr lang="en" sz="1800">
+              <a:rPr lang="en" sz="1800" dirty="0">
                 <a:solidFill>
                   <a:schemeClr val="dk1"/>
                 </a:solidFill>
@@ -11215,7 +10581,7 @@
 </p:sld>
 </file>
 
-<file path=ppt/slides/slide19.xml><?xml version="1.0" encoding="utf-8"?>
+<file path=ppt/slides/slide18.xml><?xml version="1.0" encoding="utf-8"?>
 <p:sld xmlns:a="http://schemas.openxmlformats.org/drawingml/2006/main" xmlns:r="http://schemas.openxmlformats.org/officeDocument/2006/relationships" xmlns:p="http://schemas.openxmlformats.org/presentationml/2006/main">
   <p:cSld>
     <p:spTree>
@@ -11288,6 +10654,215 @@
         </p:spPr>
       </p:pic>
     </p:spTree>
+  </p:cSld>
+  <p:clrMapOvr>
+    <a:masterClrMapping/>
+  </p:clrMapOvr>
+</p:sld>
+</file>
+
+<file path=ppt/slides/slide19.xml><?xml version="1.0" encoding="utf-8"?>
+<p:sld xmlns:a="http://schemas.openxmlformats.org/drawingml/2006/main" xmlns:r="http://schemas.openxmlformats.org/officeDocument/2006/relationships" xmlns:p="http://schemas.openxmlformats.org/presentationml/2006/main">
+  <p:cSld>
+    <p:spTree>
+      <p:nvGrpSpPr>
+        <p:cNvPr id="1" name=""/>
+        <p:cNvGrpSpPr/>
+        <p:nvPr/>
+      </p:nvGrpSpPr>
+      <p:grpSpPr>
+        <a:xfrm>
+          <a:off x="0" y="0"/>
+          <a:ext cx="0" cy="0"/>
+          <a:chOff x="0" y="0"/>
+          <a:chExt cx="0" cy="0"/>
+        </a:xfrm>
+      </p:grpSpPr>
+      <p:sp>
+        <p:nvSpPr>
+          <p:cNvPr id="2" name="Title 1"/>
+          <p:cNvSpPr>
+            <a:spLocks noGrp="1"/>
+          </p:cNvSpPr>
+          <p:nvPr>
+            <p:ph type="title"/>
+          </p:nvPr>
+        </p:nvSpPr>
+        <p:spPr/>
+        <p:txBody>
+          <a:bodyPr/>
+          <a:lstStyle/>
+          <a:p>
+            <a:r>
+              <a:rPr lang="en-US" dirty="0" smtClean="0"/>
+              <a:t>Summary</a:t>
+            </a:r>
+            <a:endParaRPr lang="en-US" dirty="0"/>
+          </a:p>
+        </p:txBody>
+      </p:sp>
+      <p:sp>
+        <p:nvSpPr>
+          <p:cNvPr id="4" name="TextBox 3"/>
+          <p:cNvSpPr txBox="1"/>
+          <p:nvPr/>
+        </p:nvSpPr>
+        <p:spPr>
+          <a:xfrm>
+            <a:off x="436418" y="1309255"/>
+            <a:ext cx="8546217" cy="3046988"/>
+          </a:xfrm>
+          <a:prstGeom prst="rect">
+            <a:avLst/>
+          </a:prstGeom>
+          <a:noFill/>
+        </p:spPr>
+        <p:txBody>
+          <a:bodyPr wrap="square" rtlCol="0">
+            <a:spAutoFit/>
+          </a:bodyPr>
+          <a:lstStyle/>
+          <a:p>
+            <a:pPr marL="285750" indent="-285750">
+              <a:buFont typeface="Wingdings" pitchFamily="2" charset="2"/>
+              <a:buChar char="q"/>
+            </a:pPr>
+            <a:r>
+              <a:rPr lang="en-US" sz="1600" b="1" dirty="0" smtClean="0">
+                <a:solidFill>
+                  <a:schemeClr val="tx1"/>
+                </a:solidFill>
+              </a:rPr>
+              <a:t>Spain government needs to understand shortfall between fossil fuel and renewable sources of energy.</a:t>
+            </a:r>
+          </a:p>
+          <a:p>
+            <a:pPr marL="285750" indent="-285750">
+              <a:buFont typeface="Wingdings" pitchFamily="2" charset="2"/>
+              <a:buChar char="q"/>
+            </a:pPr>
+            <a:endParaRPr lang="en-US" sz="1600" b="1" dirty="0" smtClean="0">
+              <a:solidFill>
+                <a:schemeClr val="tx1"/>
+              </a:solidFill>
+            </a:endParaRPr>
+          </a:p>
+          <a:p>
+            <a:pPr marL="285750" indent="-285750">
+              <a:buFont typeface="Wingdings" pitchFamily="2" charset="2"/>
+              <a:buChar char="q"/>
+            </a:pPr>
+            <a:endParaRPr lang="en-US" sz="1600" b="1" dirty="0" smtClean="0">
+              <a:solidFill>
+                <a:schemeClr val="tx1"/>
+              </a:solidFill>
+            </a:endParaRPr>
+          </a:p>
+          <a:p>
+            <a:pPr marL="285750" indent="-285750">
+              <a:buFont typeface="Wingdings" pitchFamily="2" charset="2"/>
+              <a:buChar char="q"/>
+            </a:pPr>
+            <a:r>
+              <a:rPr lang="en-US" sz="1600" b="1" dirty="0" smtClean="0">
+                <a:solidFill>
+                  <a:schemeClr val="tx1"/>
+                </a:solidFill>
+              </a:rPr>
+              <a:t>EDA was conducted on the obtained data. Features were explored and scrutinized .</a:t>
+            </a:r>
+          </a:p>
+          <a:p>
+            <a:pPr marL="285750" indent="-285750">
+              <a:buFont typeface="Wingdings" pitchFamily="2" charset="2"/>
+              <a:buChar char="q"/>
+            </a:pPr>
+            <a:endParaRPr lang="en-US" sz="1600" b="1" dirty="0" smtClean="0">
+              <a:solidFill>
+                <a:schemeClr val="tx1"/>
+              </a:solidFill>
+            </a:endParaRPr>
+          </a:p>
+          <a:p>
+            <a:pPr marL="285750" indent="-285750">
+              <a:buFont typeface="Wingdings" pitchFamily="2" charset="2"/>
+              <a:buChar char="q"/>
+            </a:pPr>
+            <a:endParaRPr lang="en-US" sz="1600" b="1" dirty="0" smtClean="0">
+              <a:solidFill>
+                <a:schemeClr val="tx1"/>
+              </a:solidFill>
+            </a:endParaRPr>
+          </a:p>
+          <a:p>
+            <a:pPr marL="285750" indent="-285750">
+              <a:buFont typeface="Wingdings" pitchFamily="2" charset="2"/>
+              <a:buChar char="q"/>
+            </a:pPr>
+            <a:r>
+              <a:rPr lang="en-US" sz="1600" b="1" dirty="0" smtClean="0">
+                <a:solidFill>
+                  <a:schemeClr val="tx1"/>
+                </a:solidFill>
+              </a:rPr>
+              <a:t>Redundant features were dropped. New features were engineered and added. </a:t>
+            </a:r>
+          </a:p>
+          <a:p>
+            <a:pPr marL="285750" indent="-285750">
+              <a:buFont typeface="Wingdings" pitchFamily="2" charset="2"/>
+              <a:buChar char="q"/>
+            </a:pPr>
+            <a:endParaRPr lang="en-US" sz="1600" b="1" dirty="0" smtClean="0">
+              <a:solidFill>
+                <a:schemeClr val="tx1"/>
+              </a:solidFill>
+            </a:endParaRPr>
+          </a:p>
+          <a:p>
+            <a:pPr marL="285750" indent="-285750">
+              <a:buFont typeface="Wingdings" pitchFamily="2" charset="2"/>
+              <a:buChar char="q"/>
+            </a:pPr>
+            <a:endParaRPr lang="en-US" sz="1600" b="1" dirty="0" smtClean="0">
+              <a:solidFill>
+                <a:schemeClr val="tx1"/>
+              </a:solidFill>
+            </a:endParaRPr>
+          </a:p>
+          <a:p>
+            <a:pPr marL="285750" indent="-285750">
+              <a:buFont typeface="Wingdings" pitchFamily="2" charset="2"/>
+              <a:buChar char="q"/>
+            </a:pPr>
+            <a:r>
+              <a:rPr lang="en-US" sz="1600" b="1" dirty="0" smtClean="0">
+                <a:solidFill>
+                  <a:schemeClr val="tx1"/>
+                </a:solidFill>
+              </a:rPr>
+              <a:t>Random Forest model outperformed other regression models.</a:t>
+            </a:r>
+          </a:p>
+          <a:p>
+            <a:pPr marL="285750" indent="-285750">
+              <a:buFont typeface="Wingdings" pitchFamily="2" charset="2"/>
+              <a:buChar char="q"/>
+            </a:pPr>
+            <a:endParaRPr lang="en-US" sz="1600" b="1" dirty="0">
+              <a:solidFill>
+                <a:schemeClr val="tx1"/>
+              </a:solidFill>
+            </a:endParaRPr>
+          </a:p>
+        </p:txBody>
+      </p:sp>
+    </p:spTree>
+    <p:extLst>
+      <p:ext uri="{BB962C8B-B14F-4D97-AF65-F5344CB8AC3E}">
+        <p14:creationId xmlns:p14="http://schemas.microsoft.com/office/powerpoint/2010/main" val="1344057170"/>
+      </p:ext>
+    </p:extLst>
   </p:cSld>
   <p:clrMapOvr>
     <a:masterClrMapping/>
@@ -11911,215 +11486,6 @@
           <a:p>
             <a:r>
               <a:rPr lang="en-US" dirty="0" smtClean="0"/>
-              <a:t>Summary</a:t>
-            </a:r>
-            <a:endParaRPr lang="en-US" dirty="0"/>
-          </a:p>
-        </p:txBody>
-      </p:sp>
-      <p:sp>
-        <p:nvSpPr>
-          <p:cNvPr id="4" name="TextBox 3"/>
-          <p:cNvSpPr txBox="1"/>
-          <p:nvPr/>
-        </p:nvSpPr>
-        <p:spPr>
-          <a:xfrm>
-            <a:off x="436418" y="1309255"/>
-            <a:ext cx="8546217" cy="3046988"/>
-          </a:xfrm>
-          <a:prstGeom prst="rect">
-            <a:avLst/>
-          </a:prstGeom>
-          <a:noFill/>
-        </p:spPr>
-        <p:txBody>
-          <a:bodyPr wrap="square" rtlCol="0">
-            <a:spAutoFit/>
-          </a:bodyPr>
-          <a:lstStyle/>
-          <a:p>
-            <a:pPr marL="285750" indent="-285750">
-              <a:buFont typeface="Wingdings" pitchFamily="2" charset="2"/>
-              <a:buChar char="q"/>
-            </a:pPr>
-            <a:r>
-              <a:rPr lang="en-US" sz="1600" b="1" dirty="0" smtClean="0">
-                <a:solidFill>
-                  <a:schemeClr val="tx1"/>
-                </a:solidFill>
-              </a:rPr>
-              <a:t>Spain government needs to understand shortfall between fossil fuel and renewable sources of energy.</a:t>
-            </a:r>
-          </a:p>
-          <a:p>
-            <a:pPr marL="285750" indent="-285750">
-              <a:buFont typeface="Wingdings" pitchFamily="2" charset="2"/>
-              <a:buChar char="q"/>
-            </a:pPr>
-            <a:endParaRPr lang="en-US" sz="1600" b="1" dirty="0" smtClean="0">
-              <a:solidFill>
-                <a:schemeClr val="tx1"/>
-              </a:solidFill>
-            </a:endParaRPr>
-          </a:p>
-          <a:p>
-            <a:pPr marL="285750" indent="-285750">
-              <a:buFont typeface="Wingdings" pitchFamily="2" charset="2"/>
-              <a:buChar char="q"/>
-            </a:pPr>
-            <a:endParaRPr lang="en-US" sz="1600" b="1" dirty="0" smtClean="0">
-              <a:solidFill>
-                <a:schemeClr val="tx1"/>
-              </a:solidFill>
-            </a:endParaRPr>
-          </a:p>
-          <a:p>
-            <a:pPr marL="285750" indent="-285750">
-              <a:buFont typeface="Wingdings" pitchFamily="2" charset="2"/>
-              <a:buChar char="q"/>
-            </a:pPr>
-            <a:r>
-              <a:rPr lang="en-US" sz="1600" b="1" dirty="0" smtClean="0">
-                <a:solidFill>
-                  <a:schemeClr val="tx1"/>
-                </a:solidFill>
-              </a:rPr>
-              <a:t>EDA was conducted on the obtained data. Features were explored and scrutinized .</a:t>
-            </a:r>
-          </a:p>
-          <a:p>
-            <a:pPr marL="285750" indent="-285750">
-              <a:buFont typeface="Wingdings" pitchFamily="2" charset="2"/>
-              <a:buChar char="q"/>
-            </a:pPr>
-            <a:endParaRPr lang="en-US" sz="1600" b="1" dirty="0" smtClean="0">
-              <a:solidFill>
-                <a:schemeClr val="tx1"/>
-              </a:solidFill>
-            </a:endParaRPr>
-          </a:p>
-          <a:p>
-            <a:pPr marL="285750" indent="-285750">
-              <a:buFont typeface="Wingdings" pitchFamily="2" charset="2"/>
-              <a:buChar char="q"/>
-            </a:pPr>
-            <a:endParaRPr lang="en-US" sz="1600" b="1" dirty="0" smtClean="0">
-              <a:solidFill>
-                <a:schemeClr val="tx1"/>
-              </a:solidFill>
-            </a:endParaRPr>
-          </a:p>
-          <a:p>
-            <a:pPr marL="285750" indent="-285750">
-              <a:buFont typeface="Wingdings" pitchFamily="2" charset="2"/>
-              <a:buChar char="q"/>
-            </a:pPr>
-            <a:r>
-              <a:rPr lang="en-US" sz="1600" b="1" dirty="0" smtClean="0">
-                <a:solidFill>
-                  <a:schemeClr val="tx1"/>
-                </a:solidFill>
-              </a:rPr>
-              <a:t>Redundant features were dropped. New features were engineered and added. </a:t>
-            </a:r>
-          </a:p>
-          <a:p>
-            <a:pPr marL="285750" indent="-285750">
-              <a:buFont typeface="Wingdings" pitchFamily="2" charset="2"/>
-              <a:buChar char="q"/>
-            </a:pPr>
-            <a:endParaRPr lang="en-US" sz="1600" b="1" dirty="0" smtClean="0">
-              <a:solidFill>
-                <a:schemeClr val="tx1"/>
-              </a:solidFill>
-            </a:endParaRPr>
-          </a:p>
-          <a:p>
-            <a:pPr marL="285750" indent="-285750">
-              <a:buFont typeface="Wingdings" pitchFamily="2" charset="2"/>
-              <a:buChar char="q"/>
-            </a:pPr>
-            <a:endParaRPr lang="en-US" sz="1600" b="1" dirty="0" smtClean="0">
-              <a:solidFill>
-                <a:schemeClr val="tx1"/>
-              </a:solidFill>
-            </a:endParaRPr>
-          </a:p>
-          <a:p>
-            <a:pPr marL="285750" indent="-285750">
-              <a:buFont typeface="Wingdings" pitchFamily="2" charset="2"/>
-              <a:buChar char="q"/>
-            </a:pPr>
-            <a:r>
-              <a:rPr lang="en-US" sz="1600" b="1" dirty="0" smtClean="0">
-                <a:solidFill>
-                  <a:schemeClr val="tx1"/>
-                </a:solidFill>
-              </a:rPr>
-              <a:t>Random Forest model outperformed other regression models.</a:t>
-            </a:r>
-          </a:p>
-          <a:p>
-            <a:pPr marL="285750" indent="-285750">
-              <a:buFont typeface="Wingdings" pitchFamily="2" charset="2"/>
-              <a:buChar char="q"/>
-            </a:pPr>
-            <a:endParaRPr lang="en-US" sz="1600" b="1" dirty="0">
-              <a:solidFill>
-                <a:schemeClr val="tx1"/>
-              </a:solidFill>
-            </a:endParaRPr>
-          </a:p>
-        </p:txBody>
-      </p:sp>
-    </p:spTree>
-    <p:extLst>
-      <p:ext uri="{BB962C8B-B14F-4D97-AF65-F5344CB8AC3E}">
-        <p14:creationId xmlns:p14="http://schemas.microsoft.com/office/powerpoint/2010/main" val="1344057170"/>
-      </p:ext>
-    </p:extLst>
-  </p:cSld>
-  <p:clrMapOvr>
-    <a:masterClrMapping/>
-  </p:clrMapOvr>
-</p:sld>
-</file>
-
-<file path=ppt/slides/slide21.xml><?xml version="1.0" encoding="utf-8"?>
-<p:sld xmlns:a="http://schemas.openxmlformats.org/drawingml/2006/main" xmlns:r="http://schemas.openxmlformats.org/officeDocument/2006/relationships" xmlns:p="http://schemas.openxmlformats.org/presentationml/2006/main">
-  <p:cSld>
-    <p:spTree>
-      <p:nvGrpSpPr>
-        <p:cNvPr id="1" name=""/>
-        <p:cNvGrpSpPr/>
-        <p:nvPr/>
-      </p:nvGrpSpPr>
-      <p:grpSpPr>
-        <a:xfrm>
-          <a:off x="0" y="0"/>
-          <a:ext cx="0" cy="0"/>
-          <a:chOff x="0" y="0"/>
-          <a:chExt cx="0" cy="0"/>
-        </a:xfrm>
-      </p:grpSpPr>
-      <p:sp>
-        <p:nvSpPr>
-          <p:cNvPr id="2" name="Title 1"/>
-          <p:cNvSpPr>
-            <a:spLocks noGrp="1"/>
-          </p:cNvSpPr>
-          <p:nvPr>
-            <p:ph type="title"/>
-          </p:nvPr>
-        </p:nvSpPr>
-        <p:spPr/>
-        <p:txBody>
-          <a:bodyPr/>
-          <a:lstStyle/>
-          <a:p>
-            <a:r>
-              <a:rPr lang="en-US" dirty="0" smtClean="0"/>
               <a:t>Recommendation</a:t>
             </a:r>
             <a:endParaRPr lang="en-US" dirty="0"/>
@@ -13380,6 +12746,172 @@
 </file>
 
 <file path=ppt/slides/slide5.xml><?xml version="1.0" encoding="utf-8"?>
+<p:sld xmlns:a="http://schemas.openxmlformats.org/drawingml/2006/main" xmlns:r="http://schemas.openxmlformats.org/officeDocument/2006/relationships" xmlns:p="http://schemas.openxmlformats.org/presentationml/2006/main">
+  <p:cSld>
+    <p:spTree>
+      <p:nvGrpSpPr>
+        <p:cNvPr id="1" name="Shape 149"/>
+        <p:cNvGrpSpPr/>
+        <p:nvPr/>
+      </p:nvGrpSpPr>
+      <p:grpSpPr>
+        <a:xfrm>
+          <a:off x="0" y="0"/>
+          <a:ext cx="0" cy="0"/>
+          <a:chOff x="0" y="0"/>
+          <a:chExt cx="0" cy="0"/>
+        </a:xfrm>
+      </p:grpSpPr>
+      <p:sp>
+        <p:nvSpPr>
+          <p:cNvPr id="150" name="Google Shape;150;p18"/>
+          <p:cNvSpPr txBox="1">
+            <a:spLocks noGrp="1"/>
+          </p:cNvSpPr>
+          <p:nvPr>
+            <p:ph type="title"/>
+          </p:nvPr>
+        </p:nvSpPr>
+        <p:spPr>
+          <a:xfrm>
+            <a:off x="311700" y="445025"/>
+            <a:ext cx="8520600" cy="572700"/>
+          </a:xfrm>
+          <a:prstGeom prst="rect">
+            <a:avLst/>
+          </a:prstGeom>
+        </p:spPr>
+        <p:txBody>
+          <a:bodyPr spcFirstLastPara="1" wrap="square" lIns="91425" tIns="91425" rIns="91425" bIns="91425" anchor="t" anchorCtr="0">
+            <a:noAutofit/>
+          </a:bodyPr>
+          <a:lstStyle/>
+          <a:p>
+            <a:pPr marL="0" lvl="0" indent="0" algn="l" rtl="0">
+              <a:spcBef>
+                <a:spcPts val="0"/>
+              </a:spcBef>
+              <a:spcAft>
+                <a:spcPts val="0"/>
+              </a:spcAft>
+              <a:buNone/>
+            </a:pPr>
+            <a:r>
+              <a:rPr lang="en"/>
+              <a:t>Problem Statement</a:t>
+            </a:r>
+            <a:endParaRPr/>
+          </a:p>
+        </p:txBody>
+      </p:sp>
+      <p:sp>
+        <p:nvSpPr>
+          <p:cNvPr id="151" name="Google Shape;151;p18"/>
+          <p:cNvSpPr txBox="1">
+            <a:spLocks noGrp="1"/>
+          </p:cNvSpPr>
+          <p:nvPr>
+            <p:ph type="body" idx="1"/>
+          </p:nvPr>
+        </p:nvSpPr>
+        <p:spPr>
+          <a:xfrm>
+            <a:off x="311700" y="1152475"/>
+            <a:ext cx="8520600" cy="3416400"/>
+          </a:xfrm>
+          <a:prstGeom prst="rect">
+            <a:avLst/>
+          </a:prstGeom>
+        </p:spPr>
+        <p:txBody>
+          <a:bodyPr spcFirstLastPara="1" wrap="square" lIns="91425" tIns="91425" rIns="91425" bIns="91425" anchor="t" anchorCtr="0">
+            <a:noAutofit/>
+          </a:bodyPr>
+          <a:lstStyle/>
+          <a:p>
+            <a:pPr marL="457200" lvl="0" indent="-342900" algn="l" rtl="0">
+              <a:spcBef>
+                <a:spcPts val="0"/>
+              </a:spcBef>
+              <a:spcAft>
+                <a:spcPts val="0"/>
+              </a:spcAft>
+              <a:buSzPts val="1800"/>
+              <a:buChar char="●"/>
+            </a:pPr>
+            <a:r>
+              <a:rPr lang="en"/>
+              <a:t>In this project, NM3 Energies were tasked to model the shortfall between the energy generated by means of fossil fuels and various renewable sources - for the country of Spain. </a:t>
+            </a:r>
+            <a:endParaRPr/>
+          </a:p>
+          <a:p>
+            <a:pPr marL="457200" lvl="0" indent="0" algn="l" rtl="0">
+              <a:spcBef>
+                <a:spcPts val="1600"/>
+              </a:spcBef>
+              <a:spcAft>
+                <a:spcPts val="0"/>
+              </a:spcAft>
+              <a:buNone/>
+            </a:pPr>
+            <a:endParaRPr/>
+          </a:p>
+          <a:p>
+            <a:pPr marL="457200" lvl="0" indent="-342900" algn="l" rtl="0">
+              <a:spcBef>
+                <a:spcPts val="1600"/>
+              </a:spcBef>
+              <a:spcAft>
+                <a:spcPts val="0"/>
+              </a:spcAft>
+              <a:buSzPts val="1800"/>
+              <a:buChar char="●"/>
+            </a:pPr>
+            <a:r>
+              <a:rPr lang="en"/>
+              <a:t>We used machine learning and several regression techniques to make predictions for the government of Spain, who is considering an expansion of it's renewable energy resource infrastructure investments and they require information on the trends and patterns of the country's renewable sources and fossil fuel energy generation.</a:t>
+            </a:r>
+            <a:endParaRPr/>
+          </a:p>
+        </p:txBody>
+      </p:sp>
+      <p:pic>
+        <p:nvPicPr>
+          <p:cNvPr id="152" name="Google Shape;152;p18"/>
+          <p:cNvPicPr preferRelativeResize="0"/>
+          <p:nvPr/>
+        </p:nvPicPr>
+        <p:blipFill rotWithShape="1">
+          <a:blip r:embed="rId3">
+            <a:alphaModFix/>
+          </a:blip>
+          <a:srcRect t="3925" b="3934"/>
+          <a:stretch/>
+        </p:blipFill>
+        <p:spPr>
+          <a:xfrm>
+            <a:off x="6791900" y="4595475"/>
+            <a:ext cx="2352100" cy="571925"/>
+          </a:xfrm>
+          <a:prstGeom prst="rect">
+            <a:avLst/>
+          </a:prstGeom>
+          <a:noFill/>
+          <a:ln>
+            <a:noFill/>
+          </a:ln>
+        </p:spPr>
+      </p:pic>
+    </p:spTree>
+  </p:cSld>
+  <p:clrMapOvr>
+    <a:masterClrMapping/>
+  </p:clrMapOvr>
+</p:sld>
+</file>
+
+<file path=ppt/slides/slide6.xml><?xml version="1.0" encoding="utf-8"?>
 <p:sld xmlns:a="http://schemas.openxmlformats.org/drawingml/2006/main" xmlns:r="http://schemas.openxmlformats.org/officeDocument/2006/relationships" xmlns:p="http://schemas.openxmlformats.org/presentationml/2006/main">
   <p:cSld>
     <p:spTree>
@@ -14779,15 +14311,15 @@
               <a:buNone/>
             </a:pPr>
             <a:r>
-              <a:rPr lang="en">
+              <a:rPr lang="en" dirty="0" smtClean="0">
                 <a:latin typeface="Average"/>
                 <a:ea typeface="Average"/>
                 <a:cs typeface="Average"/>
                 <a:sym typeface="Average"/>
               </a:rPr>
-              <a:t>PROBLEM STATEMENT</a:t>
+              <a:t>DATA CLEANING</a:t>
             </a:r>
-            <a:endParaRPr>
+            <a:endParaRPr dirty="0">
               <a:latin typeface="Average"/>
               <a:ea typeface="Average"/>
               <a:cs typeface="Average"/>
@@ -14831,467 +14363,7 @@
 </p:sld>
 </file>
 
-<file path=ppt/slides/slide6.xml><?xml version="1.0" encoding="utf-8"?>
-<p:sld xmlns:a="http://schemas.openxmlformats.org/drawingml/2006/main" xmlns:r="http://schemas.openxmlformats.org/officeDocument/2006/relationships" xmlns:p="http://schemas.openxmlformats.org/presentationml/2006/main">
-  <p:cSld>
-    <p:spTree>
-      <p:nvGrpSpPr>
-        <p:cNvPr id="1" name="Shape 149"/>
-        <p:cNvGrpSpPr/>
-        <p:nvPr/>
-      </p:nvGrpSpPr>
-      <p:grpSpPr>
-        <a:xfrm>
-          <a:off x="0" y="0"/>
-          <a:ext cx="0" cy="0"/>
-          <a:chOff x="0" y="0"/>
-          <a:chExt cx="0" cy="0"/>
-        </a:xfrm>
-      </p:grpSpPr>
-      <p:sp>
-        <p:nvSpPr>
-          <p:cNvPr id="150" name="Google Shape;150;p18"/>
-          <p:cNvSpPr txBox="1">
-            <a:spLocks noGrp="1"/>
-          </p:cNvSpPr>
-          <p:nvPr>
-            <p:ph type="title"/>
-          </p:nvPr>
-        </p:nvSpPr>
-        <p:spPr>
-          <a:xfrm>
-            <a:off x="311700" y="445025"/>
-            <a:ext cx="8520600" cy="572700"/>
-          </a:xfrm>
-          <a:prstGeom prst="rect">
-            <a:avLst/>
-          </a:prstGeom>
-        </p:spPr>
-        <p:txBody>
-          <a:bodyPr spcFirstLastPara="1" wrap="square" lIns="91425" tIns="91425" rIns="91425" bIns="91425" anchor="t" anchorCtr="0">
-            <a:noAutofit/>
-          </a:bodyPr>
-          <a:lstStyle/>
-          <a:p>
-            <a:pPr marL="0" lvl="0" indent="0" algn="l" rtl="0">
-              <a:spcBef>
-                <a:spcPts val="0"/>
-              </a:spcBef>
-              <a:spcAft>
-                <a:spcPts val="0"/>
-              </a:spcAft>
-              <a:buNone/>
-            </a:pPr>
-            <a:r>
-              <a:rPr lang="en"/>
-              <a:t>Problem Statement</a:t>
-            </a:r>
-            <a:endParaRPr/>
-          </a:p>
-        </p:txBody>
-      </p:sp>
-      <p:sp>
-        <p:nvSpPr>
-          <p:cNvPr id="151" name="Google Shape;151;p18"/>
-          <p:cNvSpPr txBox="1">
-            <a:spLocks noGrp="1"/>
-          </p:cNvSpPr>
-          <p:nvPr>
-            <p:ph type="body" idx="1"/>
-          </p:nvPr>
-        </p:nvSpPr>
-        <p:spPr>
-          <a:xfrm>
-            <a:off x="311700" y="1152475"/>
-            <a:ext cx="8520600" cy="3416400"/>
-          </a:xfrm>
-          <a:prstGeom prst="rect">
-            <a:avLst/>
-          </a:prstGeom>
-        </p:spPr>
-        <p:txBody>
-          <a:bodyPr spcFirstLastPara="1" wrap="square" lIns="91425" tIns="91425" rIns="91425" bIns="91425" anchor="t" anchorCtr="0">
-            <a:noAutofit/>
-          </a:bodyPr>
-          <a:lstStyle/>
-          <a:p>
-            <a:pPr marL="457200" lvl="0" indent="-342900" algn="l" rtl="0">
-              <a:spcBef>
-                <a:spcPts val="0"/>
-              </a:spcBef>
-              <a:spcAft>
-                <a:spcPts val="0"/>
-              </a:spcAft>
-              <a:buSzPts val="1800"/>
-              <a:buChar char="●"/>
-            </a:pPr>
-            <a:r>
-              <a:rPr lang="en"/>
-              <a:t>In this project, NM3 Energies were tasked to model the shortfall between the energy generated by means of fossil fuels and various renewable sources - for the country of Spain. </a:t>
-            </a:r>
-            <a:endParaRPr/>
-          </a:p>
-          <a:p>
-            <a:pPr marL="457200" lvl="0" indent="0" algn="l" rtl="0">
-              <a:spcBef>
-                <a:spcPts val="1600"/>
-              </a:spcBef>
-              <a:spcAft>
-                <a:spcPts val="0"/>
-              </a:spcAft>
-              <a:buNone/>
-            </a:pPr>
-            <a:endParaRPr/>
-          </a:p>
-          <a:p>
-            <a:pPr marL="457200" lvl="0" indent="-342900" algn="l" rtl="0">
-              <a:spcBef>
-                <a:spcPts val="1600"/>
-              </a:spcBef>
-              <a:spcAft>
-                <a:spcPts val="0"/>
-              </a:spcAft>
-              <a:buSzPts val="1800"/>
-              <a:buChar char="●"/>
-            </a:pPr>
-            <a:r>
-              <a:rPr lang="en"/>
-              <a:t>We used machine learning and several regression techniques to make predictions for the government of Spain, who is considering an expansion of it's renewable energy resource infrastructure investments and they require information on the trends and patterns of the country's renewable sources and fossil fuel energy generation.</a:t>
-            </a:r>
-            <a:endParaRPr/>
-          </a:p>
-        </p:txBody>
-      </p:sp>
-      <p:pic>
-        <p:nvPicPr>
-          <p:cNvPr id="152" name="Google Shape;152;p18"/>
-          <p:cNvPicPr preferRelativeResize="0"/>
-          <p:nvPr/>
-        </p:nvPicPr>
-        <p:blipFill rotWithShape="1">
-          <a:blip r:embed="rId3">
-            <a:alphaModFix/>
-          </a:blip>
-          <a:srcRect t="3925" b="3934"/>
-          <a:stretch/>
-        </p:blipFill>
-        <p:spPr>
-          <a:xfrm>
-            <a:off x="6791900" y="4595475"/>
-            <a:ext cx="2352100" cy="571925"/>
-          </a:xfrm>
-          <a:prstGeom prst="rect">
-            <a:avLst/>
-          </a:prstGeom>
-          <a:noFill/>
-          <a:ln>
-            <a:noFill/>
-          </a:ln>
-        </p:spPr>
-      </p:pic>
-    </p:spTree>
-  </p:cSld>
-  <p:clrMapOvr>
-    <a:masterClrMapping/>
-  </p:clrMapOvr>
-</p:sld>
-</file>
-
 <file path=ppt/slides/slide7.xml><?xml version="1.0" encoding="utf-8"?>
-<p:sld xmlns:a="http://schemas.openxmlformats.org/drawingml/2006/main" xmlns:r="http://schemas.openxmlformats.org/officeDocument/2006/relationships" xmlns:p="http://schemas.openxmlformats.org/presentationml/2006/main">
-  <p:cSld>
-    <p:spTree>
-      <p:nvGrpSpPr>
-        <p:cNvPr id="1" name="Shape 156"/>
-        <p:cNvGrpSpPr/>
-        <p:nvPr/>
-      </p:nvGrpSpPr>
-      <p:grpSpPr>
-        <a:xfrm>
-          <a:off x="0" y="0"/>
-          <a:ext cx="0" cy="0"/>
-          <a:chOff x="0" y="0"/>
-          <a:chExt cx="0" cy="0"/>
-        </a:xfrm>
-      </p:grpSpPr>
-      <p:sp>
-        <p:nvSpPr>
-          <p:cNvPr id="157" name="Google Shape;157;p19"/>
-          <p:cNvSpPr txBox="1">
-            <a:spLocks noGrp="1"/>
-          </p:cNvSpPr>
-          <p:nvPr>
-            <p:ph type="title"/>
-          </p:nvPr>
-        </p:nvSpPr>
-        <p:spPr>
-          <a:xfrm>
-            <a:off x="0" y="0"/>
-            <a:ext cx="4572000" cy="694200"/>
-          </a:xfrm>
-          <a:prstGeom prst="rect">
-            <a:avLst/>
-          </a:prstGeom>
-        </p:spPr>
-        <p:txBody>
-          <a:bodyPr spcFirstLastPara="1" wrap="square" lIns="91425" tIns="91425" rIns="91425" bIns="91425" anchor="ctr" anchorCtr="0">
-            <a:noAutofit/>
-          </a:bodyPr>
-          <a:lstStyle/>
-          <a:p>
-            <a:pPr marL="0" lvl="0" indent="0" algn="l" rtl="0">
-              <a:spcBef>
-                <a:spcPts val="0"/>
-              </a:spcBef>
-              <a:spcAft>
-                <a:spcPts val="0"/>
-              </a:spcAft>
-              <a:buNone/>
-            </a:pPr>
-            <a:r>
-              <a:rPr lang="en" sz="3000" dirty="0" smtClean="0"/>
-              <a:t>Understand The Data</a:t>
-            </a:r>
-            <a:endParaRPr sz="3000" dirty="0"/>
-          </a:p>
-        </p:txBody>
-      </p:sp>
-      <p:sp>
-        <p:nvSpPr>
-          <p:cNvPr id="158" name="Google Shape;158;p19"/>
-          <p:cNvSpPr txBox="1"/>
-          <p:nvPr/>
-        </p:nvSpPr>
-        <p:spPr>
-          <a:xfrm>
-            <a:off x="209400" y="867575"/>
-            <a:ext cx="4362600" cy="3570900"/>
-          </a:xfrm>
-          <a:prstGeom prst="rect">
-            <a:avLst/>
-          </a:prstGeom>
-          <a:noFill/>
-          <a:ln>
-            <a:noFill/>
-          </a:ln>
-        </p:spPr>
-        <p:txBody>
-          <a:bodyPr spcFirstLastPara="1" wrap="square" lIns="91425" tIns="91425" rIns="91425" bIns="91425" anchor="t" anchorCtr="0">
-            <a:spAutoFit/>
-          </a:bodyPr>
-          <a:lstStyle/>
-          <a:p>
-            <a:pPr marL="457200" lvl="0" indent="-342900" algn="l" rtl="0">
-              <a:lnSpc>
-                <a:spcPct val="100000"/>
-              </a:lnSpc>
-              <a:spcBef>
-                <a:spcPts val="0"/>
-              </a:spcBef>
-              <a:spcAft>
-                <a:spcPts val="0"/>
-              </a:spcAft>
-              <a:buClr>
-                <a:schemeClr val="dk1"/>
-              </a:buClr>
-              <a:buSzPts val="1800"/>
-              <a:buFont typeface="Average"/>
-              <a:buChar char="●"/>
-            </a:pPr>
-            <a:r>
-              <a:rPr lang="en" sz="1800" dirty="0">
-                <a:solidFill>
-                  <a:schemeClr val="dk1"/>
-                </a:solidFill>
-                <a:latin typeface="Average"/>
-                <a:ea typeface="Average"/>
-                <a:cs typeface="Average"/>
-                <a:sym typeface="Average"/>
-              </a:rPr>
-              <a:t>We first tried to have an understanding of the data we were given, by the spanish government, and we found it to be inconsistent.</a:t>
-            </a:r>
-            <a:endParaRPr sz="1800" dirty="0">
-              <a:solidFill>
-                <a:schemeClr val="dk1"/>
-              </a:solidFill>
-              <a:latin typeface="Average"/>
-              <a:ea typeface="Average"/>
-              <a:cs typeface="Average"/>
-              <a:sym typeface="Average"/>
-            </a:endParaRPr>
-          </a:p>
-          <a:p>
-            <a:pPr marL="0" lvl="0" indent="0" algn="l" rtl="0">
-              <a:lnSpc>
-                <a:spcPct val="100000"/>
-              </a:lnSpc>
-              <a:spcBef>
-                <a:spcPts val="1200"/>
-              </a:spcBef>
-              <a:spcAft>
-                <a:spcPts val="0"/>
-              </a:spcAft>
-              <a:buNone/>
-            </a:pPr>
-            <a:endParaRPr sz="1800" dirty="0">
-              <a:solidFill>
-                <a:schemeClr val="dk1"/>
-              </a:solidFill>
-              <a:latin typeface="Average"/>
-              <a:ea typeface="Average"/>
-              <a:cs typeface="Average"/>
-              <a:sym typeface="Average"/>
-            </a:endParaRPr>
-          </a:p>
-          <a:p>
-            <a:pPr marL="0" lvl="0" indent="0" algn="l" rtl="0">
-              <a:lnSpc>
-                <a:spcPct val="100000"/>
-              </a:lnSpc>
-              <a:spcBef>
-                <a:spcPts val="1200"/>
-              </a:spcBef>
-              <a:spcAft>
-                <a:spcPts val="0"/>
-              </a:spcAft>
-              <a:buNone/>
-            </a:pPr>
-            <a:endParaRPr sz="1800" dirty="0">
-              <a:solidFill>
-                <a:schemeClr val="dk1"/>
-              </a:solidFill>
-              <a:latin typeface="Average"/>
-              <a:ea typeface="Average"/>
-              <a:cs typeface="Average"/>
-              <a:sym typeface="Average"/>
-            </a:endParaRPr>
-          </a:p>
-          <a:p>
-            <a:pPr marL="457200" lvl="0" indent="-342900" algn="l" rtl="0">
-              <a:lnSpc>
-                <a:spcPct val="100000"/>
-              </a:lnSpc>
-              <a:spcBef>
-                <a:spcPts val="1200"/>
-              </a:spcBef>
-              <a:spcAft>
-                <a:spcPts val="0"/>
-              </a:spcAft>
-              <a:buClr>
-                <a:schemeClr val="dk1"/>
-              </a:buClr>
-              <a:buSzPts val="1800"/>
-              <a:buFont typeface="Average"/>
-              <a:buChar char="●"/>
-            </a:pPr>
-            <a:r>
-              <a:rPr lang="en" sz="1800" dirty="0">
-                <a:solidFill>
-                  <a:schemeClr val="dk1"/>
-                </a:solidFill>
-                <a:latin typeface="Average"/>
-                <a:ea typeface="Average"/>
-                <a:cs typeface="Average"/>
-                <a:sym typeface="Average"/>
-              </a:rPr>
-              <a:t>This got us stuck in the waters, so we knew the data had to be cleaned, re-structured and properly analysed</a:t>
-            </a:r>
-            <a:endParaRPr sz="1800" dirty="0">
-              <a:solidFill>
-                <a:schemeClr val="dk1"/>
-              </a:solidFill>
-              <a:latin typeface="Average"/>
-              <a:ea typeface="Average"/>
-              <a:cs typeface="Average"/>
-              <a:sym typeface="Average"/>
-            </a:endParaRPr>
-          </a:p>
-          <a:p>
-            <a:pPr marL="0" lvl="0" indent="0" algn="l" rtl="0">
-              <a:spcBef>
-                <a:spcPts val="1200"/>
-              </a:spcBef>
-              <a:spcAft>
-                <a:spcPts val="0"/>
-              </a:spcAft>
-              <a:buNone/>
-            </a:pPr>
-            <a:endParaRPr sz="1800" dirty="0">
-              <a:solidFill>
-                <a:schemeClr val="dk1"/>
-              </a:solidFill>
-              <a:latin typeface="Average"/>
-              <a:ea typeface="Average"/>
-              <a:cs typeface="Average"/>
-              <a:sym typeface="Average"/>
-            </a:endParaRPr>
-          </a:p>
-        </p:txBody>
-      </p:sp>
-      <p:pic>
-        <p:nvPicPr>
-          <p:cNvPr id="159" name="Google Shape;159;p19"/>
-          <p:cNvPicPr preferRelativeResize="0"/>
-          <p:nvPr/>
-        </p:nvPicPr>
-        <p:blipFill>
-          <a:blip r:embed="rId3">
-            <a:alphaModFix/>
-          </a:blip>
-          <a:stretch>
-            <a:fillRect/>
-          </a:stretch>
-        </p:blipFill>
-        <p:spPr>
-          <a:xfrm>
-            <a:off x="4724400" y="543341"/>
-            <a:ext cx="4267199" cy="3408323"/>
-          </a:xfrm>
-          <a:prstGeom prst="rect">
-            <a:avLst/>
-          </a:prstGeom>
-          <a:noFill/>
-          <a:ln>
-            <a:noFill/>
-          </a:ln>
-        </p:spPr>
-      </p:pic>
-      <p:pic>
-        <p:nvPicPr>
-          <p:cNvPr id="160" name="Google Shape;160;p19"/>
-          <p:cNvPicPr preferRelativeResize="0"/>
-          <p:nvPr/>
-        </p:nvPicPr>
-        <p:blipFill rotWithShape="1">
-          <a:blip r:embed="rId4">
-            <a:alphaModFix/>
-          </a:blip>
-          <a:srcRect t="3925" b="3934"/>
-          <a:stretch/>
-        </p:blipFill>
-        <p:spPr>
-          <a:xfrm>
-            <a:off x="6791900" y="4595475"/>
-            <a:ext cx="2352100" cy="571925"/>
-          </a:xfrm>
-          <a:prstGeom prst="rect">
-            <a:avLst/>
-          </a:prstGeom>
-          <a:noFill/>
-          <a:ln>
-            <a:noFill/>
-          </a:ln>
-        </p:spPr>
-      </p:pic>
-    </p:spTree>
-  </p:cSld>
-  <p:clrMapOvr>
-    <a:masterClrMapping/>
-  </p:clrMapOvr>
-</p:sld>
-</file>
-
-<file path=ppt/slides/slide8.xml><?xml version="1.0" encoding="utf-8"?>
 <p:sld xmlns:a="http://schemas.openxmlformats.org/drawingml/2006/main" xmlns:r="http://schemas.openxmlformats.org/officeDocument/2006/relationships" xmlns:p="http://schemas.openxmlformats.org/presentationml/2006/main">
   <p:cSld>
     <p:spTree>
@@ -15655,7 +14727,7 @@
 </p:sld>
 </file>
 
-<file path=ppt/slides/slide9.xml><?xml version="1.0" encoding="utf-8"?>
+<file path=ppt/slides/slide8.xml><?xml version="1.0" encoding="utf-8"?>
 <p:sld xmlns:a="http://schemas.openxmlformats.org/drawingml/2006/main" xmlns:r="http://schemas.openxmlformats.org/officeDocument/2006/relationships" xmlns:p="http://schemas.openxmlformats.org/presentationml/2006/main">
   <p:cSld>
     <p:spTree>
@@ -15918,6 +14990,301 @@
       <p:pic>
         <p:nvPicPr>
           <p:cNvPr id="176" name="Google Shape;176;p21"/>
+          <p:cNvPicPr preferRelativeResize="0"/>
+          <p:nvPr/>
+        </p:nvPicPr>
+        <p:blipFill rotWithShape="1">
+          <a:blip r:embed="rId3">
+            <a:alphaModFix/>
+          </a:blip>
+          <a:srcRect t="3925" b="3934"/>
+          <a:stretch/>
+        </p:blipFill>
+        <p:spPr>
+          <a:xfrm>
+            <a:off x="6791900" y="4595475"/>
+            <a:ext cx="2352100" cy="571925"/>
+          </a:xfrm>
+          <a:prstGeom prst="rect">
+            <a:avLst/>
+          </a:prstGeom>
+          <a:noFill/>
+          <a:ln>
+            <a:noFill/>
+          </a:ln>
+        </p:spPr>
+      </p:pic>
+    </p:spTree>
+  </p:cSld>
+  <p:clrMapOvr>
+    <a:masterClrMapping/>
+  </p:clrMapOvr>
+</p:sld>
+</file>
+
+<file path=ppt/slides/slide9.xml><?xml version="1.0" encoding="utf-8"?>
+<p:sld xmlns:a="http://schemas.openxmlformats.org/drawingml/2006/main" xmlns:r="http://schemas.openxmlformats.org/officeDocument/2006/relationships" xmlns:p="http://schemas.openxmlformats.org/presentationml/2006/main">
+  <p:cSld>
+    <p:spTree>
+      <p:nvGrpSpPr>
+        <p:cNvPr id="1" name="Shape 180"/>
+        <p:cNvGrpSpPr/>
+        <p:nvPr/>
+      </p:nvGrpSpPr>
+      <p:grpSpPr>
+        <a:xfrm>
+          <a:off x="0" y="0"/>
+          <a:ext cx="0" cy="0"/>
+          <a:chOff x="0" y="0"/>
+          <a:chExt cx="0" cy="0"/>
+        </a:xfrm>
+      </p:grpSpPr>
+      <p:sp>
+        <p:nvSpPr>
+          <p:cNvPr id="181" name="Google Shape;181;p22"/>
+          <p:cNvSpPr txBox="1">
+            <a:spLocks noGrp="1"/>
+          </p:cNvSpPr>
+          <p:nvPr>
+            <p:ph type="title"/>
+          </p:nvPr>
+        </p:nvSpPr>
+        <p:spPr>
+          <a:xfrm>
+            <a:off x="159300" y="140225"/>
+            <a:ext cx="3999900" cy="572700"/>
+          </a:xfrm>
+          <a:prstGeom prst="rect">
+            <a:avLst/>
+          </a:prstGeom>
+        </p:spPr>
+        <p:txBody>
+          <a:bodyPr spcFirstLastPara="1" wrap="square" lIns="91425" tIns="91425" rIns="91425" bIns="91425" anchor="t" anchorCtr="0">
+            <a:noAutofit/>
+          </a:bodyPr>
+          <a:lstStyle/>
+          <a:p>
+            <a:pPr marL="0" lvl="0" indent="0" algn="l" rtl="0">
+              <a:spcBef>
+                <a:spcPts val="0"/>
+              </a:spcBef>
+              <a:spcAft>
+                <a:spcPts val="0"/>
+              </a:spcAft>
+              <a:buNone/>
+            </a:pPr>
+            <a:r>
+              <a:rPr lang="en" sz="2700"/>
+              <a:t>Skew &amp; Kurtosis Analysis</a:t>
+            </a:r>
+            <a:endParaRPr sz="2700"/>
+          </a:p>
+        </p:txBody>
+      </p:sp>
+      <p:sp>
+        <p:nvSpPr>
+          <p:cNvPr id="182" name="Google Shape;182;p22"/>
+          <p:cNvSpPr txBox="1">
+            <a:spLocks noGrp="1"/>
+          </p:cNvSpPr>
+          <p:nvPr>
+            <p:ph type="body" idx="1"/>
+          </p:nvPr>
+        </p:nvSpPr>
+        <p:spPr>
+          <a:xfrm>
+            <a:off x="311700" y="1152475"/>
+            <a:ext cx="3999900" cy="3416400"/>
+          </a:xfrm>
+          <a:prstGeom prst="rect">
+            <a:avLst/>
+          </a:prstGeom>
+        </p:spPr>
+        <p:txBody>
+          <a:bodyPr spcFirstLastPara="1" wrap="square" lIns="91425" tIns="91425" rIns="91425" bIns="91425" anchor="t" anchorCtr="0">
+            <a:noAutofit/>
+          </a:bodyPr>
+          <a:lstStyle/>
+          <a:p>
+            <a:pPr marL="0" lvl="0" indent="0" algn="l" rtl="0">
+              <a:spcBef>
+                <a:spcPts val="0"/>
+              </a:spcBef>
+              <a:spcAft>
+                <a:spcPts val="0"/>
+              </a:spcAft>
+              <a:buNone/>
+            </a:pPr>
+            <a:r>
+              <a:rPr lang="en" sz="2100" b="1">
+                <a:solidFill>
+                  <a:schemeClr val="dk1"/>
+                </a:solidFill>
+              </a:rPr>
+              <a:t>Skew Analysis</a:t>
+            </a:r>
+            <a:endParaRPr sz="2100" b="1">
+              <a:solidFill>
+                <a:schemeClr val="dk1"/>
+              </a:solidFill>
+            </a:endParaRPr>
+          </a:p>
+          <a:p>
+            <a:pPr marL="457200" lvl="0" indent="-330200" algn="l" rtl="0">
+              <a:spcBef>
+                <a:spcPts val="1600"/>
+              </a:spcBef>
+              <a:spcAft>
+                <a:spcPts val="0"/>
+              </a:spcAft>
+              <a:buSzPts val="1600"/>
+              <a:buChar char="●"/>
+            </a:pPr>
+            <a:r>
+              <a:rPr lang="en" sz="1600"/>
+              <a:t>We found there to be missing information in the </a:t>
+            </a:r>
+            <a:r>
+              <a:rPr lang="en" sz="1600" b="1"/>
+              <a:t>Valencia_pressure</a:t>
+            </a:r>
+            <a:r>
+              <a:rPr lang="en" sz="1600"/>
+              <a:t> column in the dataset.</a:t>
+            </a:r>
+            <a:endParaRPr sz="1600"/>
+          </a:p>
+          <a:p>
+            <a:pPr marL="457200" lvl="0" indent="-330200" algn="l" rtl="0">
+              <a:spcBef>
+                <a:spcPts val="0"/>
+              </a:spcBef>
+              <a:spcAft>
+                <a:spcPts val="0"/>
+              </a:spcAft>
+              <a:buSzPts val="1600"/>
+              <a:buChar char="●"/>
+            </a:pPr>
+            <a:r>
+              <a:rPr lang="en" sz="1600"/>
+              <a:t>The time column was in a string format which we had to convert to </a:t>
+            </a:r>
+            <a:r>
+              <a:rPr lang="en" sz="1600" b="1"/>
+              <a:t>datetime</a:t>
+            </a:r>
+            <a:r>
+              <a:rPr lang="en" sz="1600"/>
+              <a:t> to make it suitable for out process.</a:t>
+            </a:r>
+            <a:endParaRPr sz="1600"/>
+          </a:p>
+          <a:p>
+            <a:pPr marL="457200" lvl="0" indent="-330200" algn="l" rtl="0">
+              <a:spcBef>
+                <a:spcPts val="0"/>
+              </a:spcBef>
+              <a:spcAft>
+                <a:spcPts val="0"/>
+              </a:spcAft>
+              <a:buSzPts val="1600"/>
+              <a:buChar char="●"/>
+            </a:pPr>
+            <a:r>
+              <a:rPr lang="en" sz="1600"/>
+              <a:t>Other features were converted to floats(numerical values) for the regression process.</a:t>
+            </a:r>
+            <a:endParaRPr sz="1600"/>
+          </a:p>
+        </p:txBody>
+      </p:sp>
+      <p:sp>
+        <p:nvSpPr>
+          <p:cNvPr id="183" name="Google Shape;183;p22"/>
+          <p:cNvSpPr txBox="1">
+            <a:spLocks noGrp="1"/>
+          </p:cNvSpPr>
+          <p:nvPr>
+            <p:ph type="body" idx="2"/>
+          </p:nvPr>
+        </p:nvSpPr>
+        <p:spPr>
+          <a:xfrm>
+            <a:off x="4832400" y="1152475"/>
+            <a:ext cx="3999900" cy="3416400"/>
+          </a:xfrm>
+          <a:prstGeom prst="rect">
+            <a:avLst/>
+          </a:prstGeom>
+        </p:spPr>
+        <p:txBody>
+          <a:bodyPr spcFirstLastPara="1" wrap="square" lIns="91425" tIns="91425" rIns="91425" bIns="91425" anchor="t" anchorCtr="0">
+            <a:noAutofit/>
+          </a:bodyPr>
+          <a:lstStyle/>
+          <a:p>
+            <a:pPr marL="0" lvl="0" indent="0" algn="l" rtl="0">
+              <a:spcBef>
+                <a:spcPts val="0"/>
+              </a:spcBef>
+              <a:spcAft>
+                <a:spcPts val="0"/>
+              </a:spcAft>
+              <a:buNone/>
+            </a:pPr>
+            <a:r>
+              <a:rPr lang="en" sz="2100" b="1">
+                <a:solidFill>
+                  <a:schemeClr val="dk1"/>
+                </a:solidFill>
+              </a:rPr>
+              <a:t>Kurtosis Analysis</a:t>
+            </a:r>
+            <a:endParaRPr sz="2100" b="1">
+              <a:solidFill>
+                <a:schemeClr val="dk1"/>
+              </a:solidFill>
+            </a:endParaRPr>
+          </a:p>
+          <a:p>
+            <a:pPr marL="457200" lvl="0" indent="-330200" algn="l" rtl="0">
+              <a:spcBef>
+                <a:spcPts val="1600"/>
+              </a:spcBef>
+              <a:spcAft>
+                <a:spcPts val="0"/>
+              </a:spcAft>
+              <a:buSzPts val="1600"/>
+              <a:buChar char="●"/>
+            </a:pPr>
+            <a:r>
+              <a:rPr lang="en" sz="1600"/>
+              <a:t>We had to take an in-depth view of our dataset by performing what we call a descriptive stat for each feature,i.e; the mean, median, 1st quartile, 3rd quartile, the maximum and minimum values of each feature.</a:t>
+            </a:r>
+            <a:endParaRPr sz="1600"/>
+          </a:p>
+          <a:p>
+            <a:pPr marL="457200" lvl="0" indent="-330200" algn="l" rtl="0">
+              <a:spcBef>
+                <a:spcPts val="0"/>
+              </a:spcBef>
+              <a:spcAft>
+                <a:spcPts val="0"/>
+              </a:spcAft>
+              <a:buSzPts val="1600"/>
+              <a:buChar char="●"/>
+            </a:pPr>
+            <a:r>
+              <a:rPr lang="en" sz="1600"/>
+              <a:t>This gave us more information and insight about the dataset.</a:t>
+            </a:r>
+            <a:endParaRPr sz="1600"/>
+          </a:p>
+        </p:txBody>
+      </p:sp>
+      <p:pic>
+        <p:nvPicPr>
+          <p:cNvPr id="184" name="Google Shape;184;p22"/>
           <p:cNvPicPr preferRelativeResize="0"/>
           <p:nvPr/>
         </p:nvPicPr>

</xml_diff>